<commit_message>
Fixing the corrections that I made
Changing the new script and setting everything in the older script back to how it was before.
</commit_message>
<xml_diff>
--- a/SPC by NaNs 08112021.pptx
+++ b/SPC by NaNs 08112021.pptx
@@ -4,6 +4,9 @@
   <p:sldMasterIdLst>
     <p:sldMasterId id="2147483648" r:id="rId1"/>
   </p:sldMasterIdLst>
+  <p:notesMasterIdLst>
+    <p:notesMasterId r:id="rId22"/>
+  </p:notesMasterIdLst>
   <p:sldIdLst>
     <p:sldId id="261" r:id="rId2"/>
     <p:sldId id="257" r:id="rId3"/>
@@ -20,9 +23,11 @@
     <p:sldId id="270" r:id="rId14"/>
     <p:sldId id="271" r:id="rId15"/>
     <p:sldId id="275" r:id="rId16"/>
-    <p:sldId id="273" r:id="rId17"/>
-    <p:sldId id="272" r:id="rId18"/>
-    <p:sldId id="274" r:id="rId19"/>
+    <p:sldId id="276" r:id="rId17"/>
+    <p:sldId id="278" r:id="rId18"/>
+    <p:sldId id="277" r:id="rId19"/>
+    <p:sldId id="273" r:id="rId20"/>
+    <p:sldId id="272" r:id="rId21"/>
   </p:sldIdLst>
   <p:sldSz cx="12192000" cy="6858000"/>
   <p:notesSz cx="6858000" cy="9144000"/>
@@ -122,6 +127,439 @@
     </a:lvl9pPr>
   </p:defaultTextStyle>
 </p:presentation>
+</file>
+
+<file path=ppt/notesMasters/notesMaster1.xml><?xml version="1.0" encoding="utf-8"?>
+<p:notesMaster xmlns:a="http://schemas.openxmlformats.org/drawingml/2006/main" xmlns:r="http://schemas.openxmlformats.org/officeDocument/2006/relationships" xmlns:p="http://schemas.openxmlformats.org/presentationml/2006/main">
+  <p:cSld>
+    <p:bg>
+      <p:bgRef idx="1001">
+        <a:schemeClr val="bg1"/>
+      </p:bgRef>
+    </p:bg>
+    <p:spTree>
+      <p:nvGrpSpPr>
+        <p:cNvPr id="1" name=""/>
+        <p:cNvGrpSpPr/>
+        <p:nvPr/>
+      </p:nvGrpSpPr>
+      <p:grpSpPr>
+        <a:xfrm>
+          <a:off x="0" y="0"/>
+          <a:ext cx="0" cy="0"/>
+          <a:chOff x="0" y="0"/>
+          <a:chExt cx="0" cy="0"/>
+        </a:xfrm>
+      </p:grpSpPr>
+      <p:sp>
+        <p:nvSpPr>
+          <p:cNvPr id="2" name="Header Placeholder 1"/>
+          <p:cNvSpPr>
+            <a:spLocks noGrp="1"/>
+          </p:cNvSpPr>
+          <p:nvPr>
+            <p:ph type="hdr" sz="quarter"/>
+          </p:nvPr>
+        </p:nvSpPr>
+        <p:spPr>
+          <a:xfrm>
+            <a:off x="0" y="0"/>
+            <a:ext cx="2971800" cy="458788"/>
+          </a:xfrm>
+          <a:prstGeom prst="rect">
+            <a:avLst/>
+          </a:prstGeom>
+        </p:spPr>
+        <p:txBody>
+          <a:bodyPr vert="horz" lIns="91440" tIns="45720" rIns="91440" bIns="45720" rtlCol="0"/>
+          <a:lstStyle>
+            <a:lvl1pPr algn="l">
+              <a:defRPr sz="1200"/>
+            </a:lvl1pPr>
+          </a:lstStyle>
+          <a:p>
+            <a:endParaRPr lang="en-US"/>
+          </a:p>
+        </p:txBody>
+      </p:sp>
+      <p:sp>
+        <p:nvSpPr>
+          <p:cNvPr id="3" name="Date Placeholder 2"/>
+          <p:cNvSpPr>
+            <a:spLocks noGrp="1"/>
+          </p:cNvSpPr>
+          <p:nvPr>
+            <p:ph type="dt" idx="1"/>
+          </p:nvPr>
+        </p:nvSpPr>
+        <p:spPr>
+          <a:xfrm>
+            <a:off x="3884613" y="0"/>
+            <a:ext cx="2971800" cy="458788"/>
+          </a:xfrm>
+          <a:prstGeom prst="rect">
+            <a:avLst/>
+          </a:prstGeom>
+        </p:spPr>
+        <p:txBody>
+          <a:bodyPr vert="horz" lIns="91440" tIns="45720" rIns="91440" bIns="45720" rtlCol="0"/>
+          <a:lstStyle>
+            <a:lvl1pPr algn="r">
+              <a:defRPr sz="1200"/>
+            </a:lvl1pPr>
+          </a:lstStyle>
+          <a:p>
+            <a:fld id="{D3100377-180C-0D44-BBE1-1D1CD70039AF}" type="datetimeFigureOut">
+              <a:rPr lang="en-US" smtClean="0"/>
+              <a:t>8/11/21</a:t>
+            </a:fld>
+            <a:endParaRPr lang="en-US"/>
+          </a:p>
+        </p:txBody>
+      </p:sp>
+      <p:sp>
+        <p:nvSpPr>
+          <p:cNvPr id="4" name="Slide Image Placeholder 3"/>
+          <p:cNvSpPr>
+            <a:spLocks noGrp="1" noRot="1" noChangeAspect="1"/>
+          </p:cNvSpPr>
+          <p:nvPr>
+            <p:ph type="sldImg" idx="2"/>
+          </p:nvPr>
+        </p:nvSpPr>
+        <p:spPr>
+          <a:xfrm>
+            <a:off x="685800" y="1143000"/>
+            <a:ext cx="5486400" cy="3086100"/>
+          </a:xfrm>
+          <a:prstGeom prst="rect">
+            <a:avLst/>
+          </a:prstGeom>
+          <a:noFill/>
+          <a:ln w="12700">
+            <a:solidFill>
+              <a:prstClr val="black"/>
+            </a:solidFill>
+          </a:ln>
+        </p:spPr>
+        <p:txBody>
+          <a:bodyPr vert="horz" lIns="91440" tIns="45720" rIns="91440" bIns="45720" rtlCol="0" anchor="ctr"/>
+          <a:lstStyle/>
+          <a:p>
+            <a:endParaRPr lang="en-US"/>
+          </a:p>
+        </p:txBody>
+      </p:sp>
+      <p:sp>
+        <p:nvSpPr>
+          <p:cNvPr id="5" name="Notes Placeholder 4"/>
+          <p:cNvSpPr>
+            <a:spLocks noGrp="1"/>
+          </p:cNvSpPr>
+          <p:nvPr>
+            <p:ph type="body" sz="quarter" idx="3"/>
+          </p:nvPr>
+        </p:nvSpPr>
+        <p:spPr>
+          <a:xfrm>
+            <a:off x="685800" y="4400550"/>
+            <a:ext cx="5486400" cy="3600450"/>
+          </a:xfrm>
+          <a:prstGeom prst="rect">
+            <a:avLst/>
+          </a:prstGeom>
+        </p:spPr>
+        <p:txBody>
+          <a:bodyPr vert="horz" lIns="91440" tIns="45720" rIns="91440" bIns="45720" rtlCol="0"/>
+          <a:lstStyle/>
+          <a:p>
+            <a:pPr lvl="0"/>
+            <a:r>
+              <a:rPr lang="en-US"/>
+              <a:t>Click to edit Master text styles</a:t>
+            </a:r>
+          </a:p>
+          <a:p>
+            <a:pPr lvl="1"/>
+            <a:r>
+              <a:rPr lang="en-US"/>
+              <a:t>Second level</a:t>
+            </a:r>
+          </a:p>
+          <a:p>
+            <a:pPr lvl="2"/>
+            <a:r>
+              <a:rPr lang="en-US"/>
+              <a:t>Third level</a:t>
+            </a:r>
+          </a:p>
+          <a:p>
+            <a:pPr lvl="3"/>
+            <a:r>
+              <a:rPr lang="en-US"/>
+              <a:t>Fourth level</a:t>
+            </a:r>
+          </a:p>
+          <a:p>
+            <a:pPr lvl="4"/>
+            <a:r>
+              <a:rPr lang="en-US"/>
+              <a:t>Fifth level</a:t>
+            </a:r>
+          </a:p>
+        </p:txBody>
+      </p:sp>
+      <p:sp>
+        <p:nvSpPr>
+          <p:cNvPr id="6" name="Footer Placeholder 5"/>
+          <p:cNvSpPr>
+            <a:spLocks noGrp="1"/>
+          </p:cNvSpPr>
+          <p:nvPr>
+            <p:ph type="ftr" sz="quarter" idx="4"/>
+          </p:nvPr>
+        </p:nvSpPr>
+        <p:spPr>
+          <a:xfrm>
+            <a:off x="0" y="8685213"/>
+            <a:ext cx="2971800" cy="458787"/>
+          </a:xfrm>
+          <a:prstGeom prst="rect">
+            <a:avLst/>
+          </a:prstGeom>
+        </p:spPr>
+        <p:txBody>
+          <a:bodyPr vert="horz" lIns="91440" tIns="45720" rIns="91440" bIns="45720" rtlCol="0" anchor="b"/>
+          <a:lstStyle>
+            <a:lvl1pPr algn="l">
+              <a:defRPr sz="1200"/>
+            </a:lvl1pPr>
+          </a:lstStyle>
+          <a:p>
+            <a:endParaRPr lang="en-US"/>
+          </a:p>
+        </p:txBody>
+      </p:sp>
+      <p:sp>
+        <p:nvSpPr>
+          <p:cNvPr id="7" name="Slide Number Placeholder 6"/>
+          <p:cNvSpPr>
+            <a:spLocks noGrp="1"/>
+          </p:cNvSpPr>
+          <p:nvPr>
+            <p:ph type="sldNum" sz="quarter" idx="5"/>
+          </p:nvPr>
+        </p:nvSpPr>
+        <p:spPr>
+          <a:xfrm>
+            <a:off x="3884613" y="8685213"/>
+            <a:ext cx="2971800" cy="458787"/>
+          </a:xfrm>
+          <a:prstGeom prst="rect">
+            <a:avLst/>
+          </a:prstGeom>
+        </p:spPr>
+        <p:txBody>
+          <a:bodyPr vert="horz" lIns="91440" tIns="45720" rIns="91440" bIns="45720" rtlCol="0" anchor="b"/>
+          <a:lstStyle>
+            <a:lvl1pPr algn="r">
+              <a:defRPr sz="1200"/>
+            </a:lvl1pPr>
+          </a:lstStyle>
+          <a:p>
+            <a:fld id="{90753BFF-5E5B-D740-B845-9730CCF207BE}" type="slidenum">
+              <a:rPr lang="en-US" smtClean="0"/>
+              <a:t>‹#›</a:t>
+            </a:fld>
+            <a:endParaRPr lang="en-US"/>
+          </a:p>
+        </p:txBody>
+      </p:sp>
+    </p:spTree>
+    <p:extLst>
+      <p:ext uri="{BB962C8B-B14F-4D97-AF65-F5344CB8AC3E}">
+        <p14:creationId xmlns:p14="http://schemas.microsoft.com/office/powerpoint/2010/main" val="634590967"/>
+      </p:ext>
+    </p:extLst>
+  </p:cSld>
+  <p:clrMap bg1="lt1" tx1="dk1" bg2="lt2" tx2="dk2" accent1="accent1" accent2="accent2" accent3="accent3" accent4="accent4" accent5="accent5" accent6="accent6" hlink="hlink" folHlink="folHlink"/>
+  <p:notesStyle>
+    <a:lvl1pPr marL="0" algn="l" defTabSz="914400" rtl="0" eaLnBrk="1" latinLnBrk="0" hangingPunct="1">
+      <a:defRPr sz="1200" kern="1200">
+        <a:solidFill>
+          <a:schemeClr val="tx1"/>
+        </a:solidFill>
+        <a:latin typeface="+mn-lt"/>
+        <a:ea typeface="+mn-ea"/>
+        <a:cs typeface="+mn-cs"/>
+      </a:defRPr>
+    </a:lvl1pPr>
+    <a:lvl2pPr marL="457200" algn="l" defTabSz="914400" rtl="0" eaLnBrk="1" latinLnBrk="0" hangingPunct="1">
+      <a:defRPr sz="1200" kern="1200">
+        <a:solidFill>
+          <a:schemeClr val="tx1"/>
+        </a:solidFill>
+        <a:latin typeface="+mn-lt"/>
+        <a:ea typeface="+mn-ea"/>
+        <a:cs typeface="+mn-cs"/>
+      </a:defRPr>
+    </a:lvl2pPr>
+    <a:lvl3pPr marL="914400" algn="l" defTabSz="914400" rtl="0" eaLnBrk="1" latinLnBrk="0" hangingPunct="1">
+      <a:defRPr sz="1200" kern="1200">
+        <a:solidFill>
+          <a:schemeClr val="tx1"/>
+        </a:solidFill>
+        <a:latin typeface="+mn-lt"/>
+        <a:ea typeface="+mn-ea"/>
+        <a:cs typeface="+mn-cs"/>
+      </a:defRPr>
+    </a:lvl3pPr>
+    <a:lvl4pPr marL="1371600" algn="l" defTabSz="914400" rtl="0" eaLnBrk="1" latinLnBrk="0" hangingPunct="1">
+      <a:defRPr sz="1200" kern="1200">
+        <a:solidFill>
+          <a:schemeClr val="tx1"/>
+        </a:solidFill>
+        <a:latin typeface="+mn-lt"/>
+        <a:ea typeface="+mn-ea"/>
+        <a:cs typeface="+mn-cs"/>
+      </a:defRPr>
+    </a:lvl4pPr>
+    <a:lvl5pPr marL="1828800" algn="l" defTabSz="914400" rtl="0" eaLnBrk="1" latinLnBrk="0" hangingPunct="1">
+      <a:defRPr sz="1200" kern="1200">
+        <a:solidFill>
+          <a:schemeClr val="tx1"/>
+        </a:solidFill>
+        <a:latin typeface="+mn-lt"/>
+        <a:ea typeface="+mn-ea"/>
+        <a:cs typeface="+mn-cs"/>
+      </a:defRPr>
+    </a:lvl5pPr>
+    <a:lvl6pPr marL="2286000" algn="l" defTabSz="914400" rtl="0" eaLnBrk="1" latinLnBrk="0" hangingPunct="1">
+      <a:defRPr sz="1200" kern="1200">
+        <a:solidFill>
+          <a:schemeClr val="tx1"/>
+        </a:solidFill>
+        <a:latin typeface="+mn-lt"/>
+        <a:ea typeface="+mn-ea"/>
+        <a:cs typeface="+mn-cs"/>
+      </a:defRPr>
+    </a:lvl6pPr>
+    <a:lvl7pPr marL="2743200" algn="l" defTabSz="914400" rtl="0" eaLnBrk="1" latinLnBrk="0" hangingPunct="1">
+      <a:defRPr sz="1200" kern="1200">
+        <a:solidFill>
+          <a:schemeClr val="tx1"/>
+        </a:solidFill>
+        <a:latin typeface="+mn-lt"/>
+        <a:ea typeface="+mn-ea"/>
+        <a:cs typeface="+mn-cs"/>
+      </a:defRPr>
+    </a:lvl7pPr>
+    <a:lvl8pPr marL="3200400" algn="l" defTabSz="914400" rtl="0" eaLnBrk="1" latinLnBrk="0" hangingPunct="1">
+      <a:defRPr sz="1200" kern="1200">
+        <a:solidFill>
+          <a:schemeClr val="tx1"/>
+        </a:solidFill>
+        <a:latin typeface="+mn-lt"/>
+        <a:ea typeface="+mn-ea"/>
+        <a:cs typeface="+mn-cs"/>
+      </a:defRPr>
+    </a:lvl8pPr>
+    <a:lvl9pPr marL="3657600" algn="l" defTabSz="914400" rtl="0" eaLnBrk="1" latinLnBrk="0" hangingPunct="1">
+      <a:defRPr sz="1200" kern="1200">
+        <a:solidFill>
+          <a:schemeClr val="tx1"/>
+        </a:solidFill>
+        <a:latin typeface="+mn-lt"/>
+        <a:ea typeface="+mn-ea"/>
+        <a:cs typeface="+mn-cs"/>
+      </a:defRPr>
+    </a:lvl9pPr>
+  </p:notesStyle>
+</p:notesMaster>
+</file>
+
+<file path=ppt/notesSlides/notesSlide1.xml><?xml version="1.0" encoding="utf-8"?>
+<p:notes xmlns:a="http://schemas.openxmlformats.org/drawingml/2006/main" xmlns:r="http://schemas.openxmlformats.org/officeDocument/2006/relationships" xmlns:p="http://schemas.openxmlformats.org/presentationml/2006/main">
+  <p:cSld>
+    <p:spTree>
+      <p:nvGrpSpPr>
+        <p:cNvPr id="1" name=""/>
+        <p:cNvGrpSpPr/>
+        <p:nvPr/>
+      </p:nvGrpSpPr>
+      <p:grpSpPr>
+        <a:xfrm>
+          <a:off x="0" y="0"/>
+          <a:ext cx="0" cy="0"/>
+          <a:chOff x="0" y="0"/>
+          <a:chExt cx="0" cy="0"/>
+        </a:xfrm>
+      </p:grpSpPr>
+      <p:sp>
+        <p:nvSpPr>
+          <p:cNvPr id="2" name="Slide Image Placeholder 1"/>
+          <p:cNvSpPr>
+            <a:spLocks noGrp="1" noRot="1" noChangeAspect="1"/>
+          </p:cNvSpPr>
+          <p:nvPr>
+            <p:ph type="sldImg"/>
+          </p:nvPr>
+        </p:nvSpPr>
+        <p:spPr/>
+      </p:sp>
+      <p:sp>
+        <p:nvSpPr>
+          <p:cNvPr id="3" name="Notes Placeholder 2"/>
+          <p:cNvSpPr>
+            <a:spLocks noGrp="1"/>
+          </p:cNvSpPr>
+          <p:nvPr>
+            <p:ph type="body" idx="1"/>
+          </p:nvPr>
+        </p:nvSpPr>
+        <p:spPr/>
+        <p:txBody>
+          <a:bodyPr/>
+          <a:lstStyle/>
+          <a:p>
+            <a:endParaRPr lang="en-US" dirty="0"/>
+          </a:p>
+        </p:txBody>
+      </p:sp>
+      <p:sp>
+        <p:nvSpPr>
+          <p:cNvPr id="4" name="Slide Number Placeholder 3"/>
+          <p:cNvSpPr>
+            <a:spLocks noGrp="1"/>
+          </p:cNvSpPr>
+          <p:nvPr>
+            <p:ph type="sldNum" sz="quarter" idx="5"/>
+          </p:nvPr>
+        </p:nvSpPr>
+        <p:spPr/>
+        <p:txBody>
+          <a:bodyPr/>
+          <a:lstStyle/>
+          <a:p>
+            <a:fld id="{90753BFF-5E5B-D740-B845-9730CCF207BE}" type="slidenum">
+              <a:rPr lang="en-US" smtClean="0"/>
+              <a:t>19</a:t>
+            </a:fld>
+            <a:endParaRPr lang="en-US"/>
+          </a:p>
+        </p:txBody>
+      </p:sp>
+    </p:spTree>
+    <p:extLst>
+      <p:ext uri="{BB962C8B-B14F-4D97-AF65-F5344CB8AC3E}">
+        <p14:creationId xmlns:p14="http://schemas.microsoft.com/office/powerpoint/2010/main" val="1183008974"/>
+      </p:ext>
+    </p:extLst>
+  </p:cSld>
+  <p:clrMapOvr>
+    <a:masterClrMapping/>
+  </p:clrMapOvr>
+</p:notes>
 </file>
 
 <file path=ppt/slideLayouts/slideLayout1.xml><?xml version="1.0" encoding="utf-8"?>
@@ -3616,11 +4054,20 @@
               <a:buNone/>
             </a:pPr>
             <a:r>
+              <a:rPr lang="en-US" sz="2000" b="1" dirty="0">
+                <a:latin typeface="Times New Roman" panose="02020603050405020304" pitchFamily="18" charset="0"/>
+                <a:cs typeface="Times New Roman" panose="02020603050405020304" pitchFamily="18" charset="0"/>
+              </a:rPr>
+              <a:t>Parsed by NaN Count</a:t>
+            </a:r>
+          </a:p>
+          <a:p>
+            <a:r>
               <a:rPr lang="en-US" sz="2000" dirty="0">
                 <a:latin typeface="Times New Roman" panose="02020603050405020304" pitchFamily="18" charset="0"/>
                 <a:cs typeface="Times New Roman" panose="02020603050405020304" pitchFamily="18" charset="0"/>
               </a:rPr>
-              <a:t>After running these plots and noticing that they looked different from my previous “SPC FR: Excluding IFR Items” plots, I noticed that there was a small typo in my previous script.  </a:t>
+              <a:t>No NaN: 0 NaNs Per Session</a:t>
             </a:r>
           </a:p>
           <a:p>
@@ -3629,7 +4076,25 @@
                 <a:latin typeface="Times New Roman" panose="02020603050405020304" pitchFamily="18" charset="0"/>
                 <a:cs typeface="Times New Roman" panose="02020603050405020304" pitchFamily="18" charset="0"/>
               </a:rPr>
-              <a:t>I was masking out items that were not recalled as NaNs accidentally, resulting in very high proportions between the SP numerator and SP denominator.  Although the final calculation for both analyses was the same (i.e. sp_num(i)= sum(~isnan(ifr_fr(:,1)= = 1)) and sp_denom(i)= sum(~isnan(recognized(:,i)))), this was excluding valid opportunities that Ss had to recognize an item that was not recalled.</a:t>
+              <a:t>Mid-Low NaN: 16 NaNs Per Session</a:t>
+            </a:r>
+          </a:p>
+          <a:p>
+            <a:r>
+              <a:rPr lang="en-US" sz="2000" dirty="0">
+                <a:latin typeface="Times New Roman" panose="02020603050405020304" pitchFamily="18" charset="0"/>
+                <a:cs typeface="Times New Roman" panose="02020603050405020304" pitchFamily="18" charset="0"/>
+              </a:rPr>
+              <a:t>Mid-High NaN: 56 NaNs Per Session</a:t>
+            </a:r>
+          </a:p>
+          <a:p>
+            <a:r>
+              <a:rPr lang="en-US" sz="2000" dirty="0">
+                <a:latin typeface="Times New Roman" panose="02020603050405020304" pitchFamily="18" charset="0"/>
+                <a:cs typeface="Times New Roman" panose="02020603050405020304" pitchFamily="18" charset="0"/>
+              </a:rPr>
+              <a:t>High NaN: 96 NaNs Per Session</a:t>
             </a:r>
           </a:p>
           <a:p>
@@ -3640,15 +4105,6 @@
               <a:latin typeface="Times New Roman" panose="02020603050405020304" pitchFamily="18" charset="0"/>
               <a:cs typeface="Times New Roman" panose="02020603050405020304" pitchFamily="18" charset="0"/>
             </a:endParaRPr>
-          </a:p>
-          <a:p>
-            <a:r>
-              <a:rPr lang="en-US" sz="2000" dirty="0">
-                <a:latin typeface="Times New Roman" panose="02020603050405020304" pitchFamily="18" charset="0"/>
-                <a:cs typeface="Times New Roman" panose="02020603050405020304" pitchFamily="18" charset="0"/>
-              </a:rPr>
-              <a:t>I’ve included a corrected version of my previous plot with the adjusted code (which matches) and checked different subject/session combinations from both scripts against each other, to make sure that the numbers match as well.  </a:t>
-            </a:r>
           </a:p>
         </p:txBody>
       </p:sp>
@@ -3716,10 +4172,10 @@
       </p:sp>
       <p:pic>
         <p:nvPicPr>
-          <p:cNvPr id="7" name="Content Placeholder 6" descr="Chart, line chart&#10;&#10;Description automatically generated">
-            <a:extLst>
-              <a:ext uri="{FF2B5EF4-FFF2-40B4-BE49-F238E27FC236}">
-                <a16:creationId xmlns:a16="http://schemas.microsoft.com/office/drawing/2014/main" id="{E2991746-5C4F-DD49-9497-16334AAD95F0}"/>
+          <p:cNvPr id="11" name="Content Placeholder 10" descr="Chart, line chart&#10;&#10;Description automatically generated">
+            <a:extLst>
+              <a:ext uri="{FF2B5EF4-FFF2-40B4-BE49-F238E27FC236}">
+                <a16:creationId xmlns:a16="http://schemas.microsoft.com/office/drawing/2014/main" id="{37EE4BEF-C138-2A46-8245-190CC77C1345}"/>
               </a:ext>
             </a:extLst>
           </p:cNvPr>
@@ -3807,10 +4263,10 @@
       </p:sp>
       <p:pic>
         <p:nvPicPr>
-          <p:cNvPr id="5" name="Content Placeholder 4" descr="Chart, line chart&#10;&#10;Description automatically generated">
-            <a:extLst>
-              <a:ext uri="{FF2B5EF4-FFF2-40B4-BE49-F238E27FC236}">
-                <a16:creationId xmlns:a16="http://schemas.microsoft.com/office/drawing/2014/main" id="{9618742C-37A1-0F42-887A-DA6EB3153E0D}"/>
+          <p:cNvPr id="9" name="Content Placeholder 8" descr="Chart, line chart&#10;&#10;Description automatically generated">
+            <a:extLst>
+              <a:ext uri="{FF2B5EF4-FFF2-40B4-BE49-F238E27FC236}">
+                <a16:creationId xmlns:a16="http://schemas.microsoft.com/office/drawing/2014/main" id="{14E598C7-73AC-034C-984B-F6AE7785D55A}"/>
               </a:ext>
             </a:extLst>
           </p:cNvPr>
@@ -3829,8 +4285,8 @@
         </p:blipFill>
         <p:spPr>
           <a:xfrm>
-            <a:off x="3195638" y="1826022"/>
-            <a:ext cx="5800725" cy="4350543"/>
+            <a:off x="3195108" y="1825625"/>
+            <a:ext cx="5801784" cy="4351338"/>
           </a:xfrm>
         </p:spPr>
       </p:pic>
@@ -3898,10 +4354,10 @@
       </p:sp>
       <p:pic>
         <p:nvPicPr>
-          <p:cNvPr id="5" name="Content Placeholder 4" descr="Chart, line chart&#10;&#10;Description automatically generated">
-            <a:extLst>
-              <a:ext uri="{FF2B5EF4-FFF2-40B4-BE49-F238E27FC236}">
-                <a16:creationId xmlns:a16="http://schemas.microsoft.com/office/drawing/2014/main" id="{0DCBC54C-FA23-274A-B78B-4FA079146717}"/>
+          <p:cNvPr id="9" name="Content Placeholder 8" descr="Chart, line chart&#10;&#10;Description automatically generated">
+            <a:extLst>
+              <a:ext uri="{FF2B5EF4-FFF2-40B4-BE49-F238E27FC236}">
+                <a16:creationId xmlns:a16="http://schemas.microsoft.com/office/drawing/2014/main" id="{9F2C6085-9CB2-A747-A215-A217087B65A6}"/>
               </a:ext>
             </a:extLst>
           </p:cNvPr>
@@ -3920,8 +4376,8 @@
         </p:blipFill>
         <p:spPr>
           <a:xfrm>
-            <a:off x="3195638" y="1826022"/>
-            <a:ext cx="5800725" cy="4350543"/>
+            <a:off x="3195108" y="1825625"/>
+            <a:ext cx="5801784" cy="4351338"/>
           </a:xfrm>
         </p:spPr>
       </p:pic>
@@ -3989,10 +4445,10 @@
       </p:sp>
       <p:pic>
         <p:nvPicPr>
-          <p:cNvPr id="5" name="Content Placeholder 4" descr="Chart, line chart&#10;&#10;Description automatically generated">
-            <a:extLst>
-              <a:ext uri="{FF2B5EF4-FFF2-40B4-BE49-F238E27FC236}">
-                <a16:creationId xmlns:a16="http://schemas.microsoft.com/office/drawing/2014/main" id="{5480A45F-0F0E-BC4A-A359-0F99528A1652}"/>
+          <p:cNvPr id="9" name="Content Placeholder 8" descr="Chart, line chart&#10;&#10;Description automatically generated">
+            <a:extLst>
+              <a:ext uri="{FF2B5EF4-FFF2-40B4-BE49-F238E27FC236}">
+                <a16:creationId xmlns:a16="http://schemas.microsoft.com/office/drawing/2014/main" id="{9A408437-A341-4540-9127-D4D55684B0AF}"/>
               </a:ext>
             </a:extLst>
           </p:cNvPr>
@@ -4051,7 +4507,7 @@
           <p:cNvPr id="2" name="Title 1">
             <a:extLst>
               <a:ext uri="{FF2B5EF4-FFF2-40B4-BE49-F238E27FC236}">
-                <a16:creationId xmlns:a16="http://schemas.microsoft.com/office/drawing/2014/main" id="{9604946D-B8B7-3D45-BE6B-06D7605C5D29}"/>
+                <a16:creationId xmlns:a16="http://schemas.microsoft.com/office/drawing/2014/main" id="{3863ED1F-09FF-9A49-A3BB-A09EBC040632}"/>
               </a:ext>
             </a:extLst>
           </p:cNvPr>
@@ -4072,34 +4528,1013 @@
                 <a:latin typeface="Times New Roman" panose="02020603050405020304" pitchFamily="18" charset="0"/>
                 <a:cs typeface="Times New Roman" panose="02020603050405020304" pitchFamily="18" charset="0"/>
               </a:rPr>
+              <a:t>Corrections For SPC FR Excluding IFR Items</a:t>
+            </a:r>
+          </a:p>
+        </p:txBody>
+      </p:sp>
+      <p:sp>
+        <p:nvSpPr>
+          <p:cNvPr id="3" name="Content Placeholder 2">
+            <a:extLst>
+              <a:ext uri="{FF2B5EF4-FFF2-40B4-BE49-F238E27FC236}">
+                <a16:creationId xmlns:a16="http://schemas.microsoft.com/office/drawing/2014/main" id="{450FF1A9-E7D2-6542-850A-8E660C5A6AE1}"/>
+              </a:ext>
+            </a:extLst>
+          </p:cNvPr>
+          <p:cNvSpPr>
+            <a:spLocks noGrp="1"/>
+          </p:cNvSpPr>
+          <p:nvPr>
+            <p:ph idx="1"/>
+          </p:nvPr>
+        </p:nvSpPr>
+        <p:spPr/>
+        <p:txBody>
+          <a:bodyPr>
+            <a:normAutofit/>
+          </a:bodyPr>
+          <a:lstStyle/>
+          <a:p>
+            <a:r>
+              <a:rPr lang="en-US" sz="2400" dirty="0">
+                <a:latin typeface="Times New Roman" panose="02020603050405020304" pitchFamily="18" charset="0"/>
+                <a:cs typeface="Times New Roman" panose="02020603050405020304" pitchFamily="18" charset="0"/>
+              </a:rPr>
+              <a:t>The only correction made to my original code (predictors_recognition_07192021.m) was that I used recognition2 as a variable with successfully retrieved IFR items to be masked out and left the recognized variable alone.  </a:t>
+            </a:r>
+          </a:p>
+          <a:p>
+            <a:endParaRPr lang="en-US" sz="2400" dirty="0">
+              <a:latin typeface="Times New Roman" panose="02020603050405020304" pitchFamily="18" charset="0"/>
+              <a:cs typeface="Times New Roman" panose="02020603050405020304" pitchFamily="18" charset="0"/>
+            </a:endParaRPr>
+          </a:p>
+          <a:p>
+            <a:endParaRPr lang="en-US" sz="2400" dirty="0">
+              <a:latin typeface="Times New Roman" panose="02020603050405020304" pitchFamily="18" charset="0"/>
+              <a:cs typeface="Times New Roman" panose="02020603050405020304" pitchFamily="18" charset="0"/>
+            </a:endParaRPr>
+          </a:p>
+          <a:p>
+            <a:r>
+              <a:rPr lang="en-US" sz="2400" dirty="0">
+                <a:latin typeface="Times New Roman" panose="02020603050405020304" pitchFamily="18" charset="0"/>
+                <a:cs typeface="Times New Roman" panose="02020603050405020304" pitchFamily="18" charset="0"/>
+              </a:rPr>
+              <a:t>You can find this changes in the version history on Github starting at line 942, but I’ve included an explanation with the specific, extracted lines of code + comments on the following 2 slides. </a:t>
+            </a:r>
+          </a:p>
+        </p:txBody>
+      </p:sp>
+    </p:spTree>
+    <p:extLst>
+      <p:ext uri="{BB962C8B-B14F-4D97-AF65-F5344CB8AC3E}">
+        <p14:creationId xmlns:p14="http://schemas.microsoft.com/office/powerpoint/2010/main" val="3955626596"/>
+      </p:ext>
+    </p:extLst>
+  </p:cSld>
+  <p:clrMapOvr>
+    <a:masterClrMapping/>
+  </p:clrMapOvr>
+</p:sld>
+</file>
+
+<file path=ppt/slides/slide17.xml><?xml version="1.0" encoding="utf-8"?>
+<p:sld xmlns:a="http://schemas.openxmlformats.org/drawingml/2006/main" xmlns:r="http://schemas.openxmlformats.org/officeDocument/2006/relationships" xmlns:p="http://schemas.openxmlformats.org/presentationml/2006/main">
+  <p:cSld>
+    <p:spTree>
+      <p:nvGrpSpPr>
+        <p:cNvPr id="1" name=""/>
+        <p:cNvGrpSpPr/>
+        <p:nvPr/>
+      </p:nvGrpSpPr>
+      <p:grpSpPr>
+        <a:xfrm>
+          <a:off x="0" y="0"/>
+          <a:ext cx="0" cy="0"/>
+          <a:chOff x="0" y="0"/>
+          <a:chExt cx="0" cy="0"/>
+        </a:xfrm>
+      </p:grpSpPr>
+      <p:sp>
+        <p:nvSpPr>
+          <p:cNvPr id="2" name="Title 1">
+            <a:extLst>
+              <a:ext uri="{FF2B5EF4-FFF2-40B4-BE49-F238E27FC236}">
+                <a16:creationId xmlns:a16="http://schemas.microsoft.com/office/drawing/2014/main" id="{3863ED1F-09FF-9A49-A3BB-A09EBC040632}"/>
+              </a:ext>
+            </a:extLst>
+          </p:cNvPr>
+          <p:cNvSpPr>
+            <a:spLocks noGrp="1"/>
+          </p:cNvSpPr>
+          <p:nvPr>
+            <p:ph type="title"/>
+          </p:nvPr>
+        </p:nvSpPr>
+        <p:spPr/>
+        <p:txBody>
+          <a:bodyPr/>
+          <a:lstStyle/>
+          <a:p>
+            <a:r>
+              <a:rPr lang="en-US" dirty="0">
+                <a:latin typeface="Times New Roman" panose="02020603050405020304" pitchFamily="18" charset="0"/>
+                <a:cs typeface="Times New Roman" panose="02020603050405020304" pitchFamily="18" charset="0"/>
+              </a:rPr>
+              <a:t>Inaccuracy in Original Code</a:t>
+            </a:r>
+          </a:p>
+        </p:txBody>
+      </p:sp>
+      <p:sp>
+        <p:nvSpPr>
+          <p:cNvPr id="3" name="Content Placeholder 2">
+            <a:extLst>
+              <a:ext uri="{FF2B5EF4-FFF2-40B4-BE49-F238E27FC236}">
+                <a16:creationId xmlns:a16="http://schemas.microsoft.com/office/drawing/2014/main" id="{450FF1A9-E7D2-6542-850A-8E660C5A6AE1}"/>
+              </a:ext>
+            </a:extLst>
+          </p:cNvPr>
+          <p:cNvSpPr>
+            <a:spLocks noGrp="1"/>
+          </p:cNvSpPr>
+          <p:nvPr>
+            <p:ph idx="1"/>
+          </p:nvPr>
+        </p:nvSpPr>
+        <p:spPr/>
+        <p:txBody>
+          <a:bodyPr>
+            <a:normAutofit/>
+          </a:bodyPr>
+          <a:lstStyle/>
+          <a:p>
+            <a:pPr marL="0" indent="0">
+              <a:buNone/>
+            </a:pPr>
+            <a:r>
+              <a:rPr lang="en-US" sz="1200" dirty="0">
+                <a:solidFill>
+                  <a:schemeClr val="accent6">
+                    <a:lumMod val="75000"/>
+                  </a:schemeClr>
+                </a:solidFill>
+                <a:latin typeface="Courier" pitchFamily="2" charset="0"/>
+              </a:rPr>
+              <a:t>%I found a cleaner way to do this in my new script</a:t>
+            </a:r>
+          </a:p>
+          <a:p>
+            <a:pPr marL="0" indent="0">
+              <a:buNone/>
+            </a:pPr>
+            <a:r>
+              <a:rPr lang="en-US" sz="1200" dirty="0">
+                <a:solidFill>
+                  <a:schemeClr val="accent6">
+                    <a:lumMod val="75000"/>
+                  </a:schemeClr>
+                </a:solidFill>
+                <a:latin typeface="Courier" pitchFamily="2" charset="0"/>
+              </a:rPr>
+              <a:t>%But it doesn’t change the outcome.</a:t>
+            </a:r>
+            <a:endParaRPr lang="en-US" sz="1200" dirty="0">
+              <a:latin typeface="Courier" pitchFamily="2" charset="0"/>
+            </a:endParaRPr>
+          </a:p>
+          <a:p>
+            <a:pPr marL="0" indent="0" latinLnBrk="1">
+              <a:buNone/>
+            </a:pPr>
+            <a:r>
+              <a:rPr lang="en-US" sz="1200" dirty="0">
+                <a:latin typeface="Courier" pitchFamily="2" charset="0"/>
+              </a:rPr>
+              <a:t>was_recalled= recitemnos(recitemnos&gt;0);</a:t>
+            </a:r>
+          </a:p>
+          <a:p>
+            <a:pPr marL="0" indent="0" latinLnBrk="1">
+              <a:buNone/>
+            </a:pPr>
+            <a:r>
+              <a:rPr lang="en-US" sz="1200" dirty="0">
+                <a:solidFill>
+                  <a:schemeClr val="accent6">
+                    <a:lumMod val="75000"/>
+                  </a:schemeClr>
+                </a:solidFill>
+                <a:latin typeface="Courier" pitchFamily="2" charset="0"/>
+              </a:rPr>
+              <a:t>%Match the pres_itemnos that match IFR rec_itemnos</a:t>
+            </a:r>
+          </a:p>
+          <a:p>
+            <a:pPr marL="0" indent="0" latinLnBrk="1">
+              <a:buNone/>
+            </a:pPr>
+            <a:r>
+              <a:rPr lang="en-US" sz="1200" dirty="0">
+                <a:solidFill>
+                  <a:schemeClr val="accent6">
+                    <a:lumMod val="75000"/>
+                  </a:schemeClr>
+                </a:solidFill>
+                <a:latin typeface="Courier" pitchFamily="2" charset="0"/>
+              </a:rPr>
+              <a:t>%Originally, I had intended for recognized2 to be the conditional variable for IFR Only and just use “recognized” for Not IFR; </a:t>
+            </a:r>
+          </a:p>
+          <a:p>
+            <a:pPr marL="0" indent="0" latinLnBrk="1">
+              <a:buNone/>
+            </a:pPr>
+            <a:r>
+              <a:rPr lang="en-US" sz="1200" dirty="0">
+                <a:latin typeface="Courier" pitchFamily="2" charset="0"/>
+              </a:rPr>
+              <a:t>recognized2= recognized;</a:t>
+            </a:r>
+          </a:p>
+          <a:p>
+            <a:pPr marL="0" indent="0" latinLnBrk="1">
+              <a:buNone/>
+            </a:pPr>
+            <a:r>
+              <a:rPr lang="en-US" sz="1200" dirty="0">
+                <a:latin typeface="Courier" pitchFamily="2" charset="0"/>
+              </a:rPr>
+              <a:t>recognized2(~ismember(presitemnos, was_recalled))=nan;</a:t>
+            </a:r>
+            <a:r>
+              <a:rPr lang="en-US" sz="1200" dirty="0">
+                <a:solidFill>
+                  <a:schemeClr val="accent6">
+                    <a:lumMod val="75000"/>
+                  </a:schemeClr>
+                </a:solidFill>
+                <a:latin typeface="Courier" pitchFamily="2" charset="0"/>
+              </a:rPr>
+              <a:t> </a:t>
+            </a:r>
+          </a:p>
+          <a:p>
+            <a:pPr marL="0" indent="0" latinLnBrk="1">
+              <a:buNone/>
+            </a:pPr>
+            <a:r>
+              <a:rPr lang="en-US" sz="1200" dirty="0">
+                <a:solidFill>
+                  <a:schemeClr val="accent6">
+                    <a:lumMod val="75000"/>
+                  </a:schemeClr>
+                </a:solidFill>
+                <a:latin typeface="Courier" pitchFamily="2" charset="0"/>
+              </a:rPr>
+              <a:t>%However, using recognized as a comprehensive mask is not correct for the Excluding IFR analysis</a:t>
+            </a:r>
+            <a:endParaRPr lang="en-US" sz="1200" dirty="0">
+              <a:latin typeface="Courier" pitchFamily="2" charset="0"/>
+            </a:endParaRPr>
+          </a:p>
+          <a:p>
+            <a:pPr marL="0" indent="0" latinLnBrk="1">
+              <a:buNone/>
+            </a:pPr>
+            <a:r>
+              <a:rPr lang="en-US" sz="1200" dirty="0">
+                <a:latin typeface="Courier" pitchFamily="2" charset="0"/>
+              </a:rPr>
+              <a:t>recognized(ismember(presitemnos, was_recalled))= nan;</a:t>
+            </a:r>
+          </a:p>
+          <a:p>
+            <a:pPr marL="0" indent="0" latinLnBrk="1">
+              <a:buNone/>
+            </a:pPr>
+            <a:r>
+              <a:rPr lang="en-US" sz="1200" dirty="0">
+                <a:solidFill>
+                  <a:srgbClr val="0432FF"/>
+                </a:solidFill>
+                <a:latin typeface="Courier" pitchFamily="2" charset="0"/>
+              </a:rPr>
+              <a:t>for </a:t>
+            </a:r>
+            <a:r>
+              <a:rPr lang="en-US" sz="1200" dirty="0">
+                <a:latin typeface="Courier" pitchFamily="2" charset="0"/>
+              </a:rPr>
+              <a:t>i = 1:LL</a:t>
+            </a:r>
+          </a:p>
+          <a:p>
+            <a:pPr marL="457200" lvl="1" indent="0" latinLnBrk="1">
+              <a:buNone/>
+            </a:pPr>
+            <a:r>
+              <a:rPr lang="en-US" sz="1200" dirty="0">
+                <a:latin typeface="Courier" pitchFamily="2" charset="0"/>
+              </a:rPr>
+              <a:t>fr_num_sp(i)= sum(sum(recognized(:,i)==1));</a:t>
+            </a:r>
+            <a:r>
+              <a:rPr lang="en-US" sz="1200" dirty="0">
+                <a:solidFill>
+                  <a:schemeClr val="accent6">
+                    <a:lumMod val="75000"/>
+                  </a:schemeClr>
+                </a:solidFill>
+                <a:latin typeface="Courier" pitchFamily="2" charset="0"/>
+              </a:rPr>
+              <a:t> %The way that I was calculating the numerator was fine</a:t>
+            </a:r>
+          </a:p>
+          <a:p>
+            <a:pPr marL="457200" lvl="1" indent="0" latinLnBrk="1">
+              <a:buNone/>
+            </a:pPr>
+            <a:r>
+              <a:rPr lang="en-US" sz="1200" dirty="0">
+                <a:latin typeface="Courier" pitchFamily="2" charset="0"/>
+              </a:rPr>
+              <a:t>fr_denom_sp(i)= sum(sum(~isnan(recognized(:,i))));</a:t>
+            </a:r>
+            <a:r>
+              <a:rPr lang="en-US" sz="1200" dirty="0">
+                <a:solidFill>
+                  <a:schemeClr val="accent6">
+                    <a:lumMod val="75000"/>
+                  </a:schemeClr>
+                </a:solidFill>
+                <a:latin typeface="Courier" pitchFamily="2" charset="0"/>
+              </a:rPr>
+              <a:t> % This was the problem, this was counting all the successfully recalled items as NaNs.  There were a small number of items e.g., recall= = 0 &amp; recognized = = 0 or 1 that were still counted here, which is why the proportion wasn’t all 1’s.  </a:t>
+            </a:r>
+            <a:endParaRPr lang="en-US" sz="1200" dirty="0">
+              <a:latin typeface="Courier" pitchFamily="2" charset="0"/>
+            </a:endParaRPr>
+          </a:p>
+          <a:p>
+            <a:pPr marL="0" indent="0" latinLnBrk="1">
+              <a:buNone/>
+            </a:pPr>
+            <a:r>
+              <a:rPr lang="en-US" sz="1200" dirty="0">
+                <a:solidFill>
+                  <a:srgbClr val="0432FF"/>
+                </a:solidFill>
+                <a:latin typeface="Courier" pitchFamily="2" charset="0"/>
+              </a:rPr>
+              <a:t>end </a:t>
+            </a:r>
+            <a:endParaRPr lang="en-US" sz="1200" dirty="0">
+              <a:latin typeface="Courier" pitchFamily="2" charset="0"/>
+            </a:endParaRPr>
+          </a:p>
+          <a:p>
+            <a:pPr marL="0" indent="0">
+              <a:buNone/>
+            </a:pPr>
+            <a:endParaRPr lang="en-US" sz="1200" dirty="0">
+              <a:latin typeface="Times New Roman" panose="02020603050405020304" pitchFamily="18" charset="0"/>
+              <a:cs typeface="Times New Roman" panose="02020603050405020304" pitchFamily="18" charset="0"/>
+            </a:endParaRPr>
+          </a:p>
+        </p:txBody>
+      </p:sp>
+    </p:spTree>
+    <p:extLst>
+      <p:ext uri="{BB962C8B-B14F-4D97-AF65-F5344CB8AC3E}">
+        <p14:creationId xmlns:p14="http://schemas.microsoft.com/office/powerpoint/2010/main" val="1017961162"/>
+      </p:ext>
+    </p:extLst>
+  </p:cSld>
+  <p:clrMapOvr>
+    <a:masterClrMapping/>
+  </p:clrMapOvr>
+</p:sld>
+</file>
+
+<file path=ppt/slides/slide18.xml><?xml version="1.0" encoding="utf-8"?>
+<p:sld xmlns:a="http://schemas.openxmlformats.org/drawingml/2006/main" xmlns:r="http://schemas.openxmlformats.org/officeDocument/2006/relationships" xmlns:p="http://schemas.openxmlformats.org/presentationml/2006/main">
+  <p:cSld>
+    <p:spTree>
+      <p:nvGrpSpPr>
+        <p:cNvPr id="1" name=""/>
+        <p:cNvGrpSpPr/>
+        <p:nvPr/>
+      </p:nvGrpSpPr>
+      <p:grpSpPr>
+        <a:xfrm>
+          <a:off x="0" y="0"/>
+          <a:ext cx="0" cy="0"/>
+          <a:chOff x="0" y="0"/>
+          <a:chExt cx="0" cy="0"/>
+        </a:xfrm>
+      </p:grpSpPr>
+      <p:sp>
+        <p:nvSpPr>
+          <p:cNvPr id="2" name="Title 1">
+            <a:extLst>
+              <a:ext uri="{FF2B5EF4-FFF2-40B4-BE49-F238E27FC236}">
+                <a16:creationId xmlns:a16="http://schemas.microsoft.com/office/drawing/2014/main" id="{3863ED1F-09FF-9A49-A3BB-A09EBC040632}"/>
+              </a:ext>
+            </a:extLst>
+          </p:cNvPr>
+          <p:cNvSpPr>
+            <a:spLocks noGrp="1"/>
+          </p:cNvSpPr>
+          <p:nvPr>
+            <p:ph type="title"/>
+          </p:nvPr>
+        </p:nvSpPr>
+        <p:spPr/>
+        <p:txBody>
+          <a:bodyPr/>
+          <a:lstStyle/>
+          <a:p>
+            <a:r>
+              <a:rPr lang="en-US" dirty="0">
+                <a:latin typeface="Times New Roman" panose="02020603050405020304" pitchFamily="18" charset="0"/>
+                <a:cs typeface="Times New Roman" panose="02020603050405020304" pitchFamily="18" charset="0"/>
+              </a:rPr>
+              <a:t>Corrections in New and Old Code </a:t>
+            </a:r>
+          </a:p>
+        </p:txBody>
+      </p:sp>
+      <p:sp>
+        <p:nvSpPr>
+          <p:cNvPr id="3" name="Content Placeholder 2">
+            <a:extLst>
+              <a:ext uri="{FF2B5EF4-FFF2-40B4-BE49-F238E27FC236}">
+                <a16:creationId xmlns:a16="http://schemas.microsoft.com/office/drawing/2014/main" id="{450FF1A9-E7D2-6542-850A-8E660C5A6AE1}"/>
+              </a:ext>
+            </a:extLst>
+          </p:cNvPr>
+          <p:cNvSpPr>
+            <a:spLocks noGrp="1"/>
+          </p:cNvSpPr>
+          <p:nvPr>
+            <p:ph idx="1"/>
+          </p:nvPr>
+        </p:nvSpPr>
+        <p:spPr/>
+        <p:txBody>
+          <a:bodyPr>
+            <a:normAutofit fontScale="55000" lnSpcReduction="20000"/>
+          </a:bodyPr>
+          <a:lstStyle/>
+          <a:p>
+            <a:pPr marL="0" indent="0">
+              <a:buNone/>
+            </a:pPr>
+            <a:r>
+              <a:rPr lang="en-US" dirty="0">
+                <a:solidFill>
+                  <a:schemeClr val="accent6">
+                    <a:lumMod val="75000"/>
+                  </a:schemeClr>
+                </a:solidFill>
+                <a:latin typeface="Courier" pitchFamily="2" charset="0"/>
+              </a:rPr>
+              <a:t>%Find rec_itemnos for IFR items</a:t>
+            </a:r>
+          </a:p>
+          <a:p>
+            <a:pPr marL="0" indent="0">
+              <a:buNone/>
+            </a:pPr>
+            <a:r>
+              <a:rPr lang="en-US" dirty="0">
+                <a:latin typeface="Courier" pitchFamily="2" charset="0"/>
+              </a:rPr>
+              <a:t>was_recalled= recitemnos(recitemnos&gt;0); </a:t>
+            </a:r>
+            <a:r>
+              <a:rPr lang="en-US" dirty="0">
+                <a:solidFill>
+                  <a:schemeClr val="accent6">
+                    <a:lumMod val="75000"/>
+                  </a:schemeClr>
+                </a:solidFill>
+                <a:latin typeface="Courier" pitchFamily="2" charset="0"/>
+              </a:rPr>
+              <a:t>%I found a cleaner way to do this in my new script</a:t>
+            </a:r>
+          </a:p>
+          <a:p>
+            <a:pPr marL="0" indent="0">
+              <a:buNone/>
+            </a:pPr>
+            <a:r>
+              <a:rPr lang="en-US" dirty="0">
+                <a:solidFill>
+                  <a:schemeClr val="accent6">
+                    <a:lumMod val="75000"/>
+                  </a:schemeClr>
+                </a:solidFill>
+                <a:latin typeface="Courier" pitchFamily="2" charset="0"/>
+              </a:rPr>
+              <a:t>%But it doesn’t change the outcome.</a:t>
+            </a:r>
+            <a:endParaRPr lang="en-US" dirty="0">
+              <a:latin typeface="Courier" pitchFamily="2" charset="0"/>
+            </a:endParaRPr>
+          </a:p>
+          <a:p>
+            <a:pPr marL="0" indent="0">
+              <a:buNone/>
+            </a:pPr>
+            <a:r>
+              <a:rPr lang="en-US" dirty="0">
+                <a:solidFill>
+                  <a:schemeClr val="accent6">
+                    <a:lumMod val="75000"/>
+                  </a:schemeClr>
+                </a:solidFill>
+                <a:latin typeface="Courier" pitchFamily="2" charset="0"/>
+              </a:rPr>
+              <a:t>%Create a copied version of the recognized variable for numerator, masking out not recalled items</a:t>
+            </a:r>
+          </a:p>
+          <a:p>
+            <a:pPr marL="0" indent="0">
+              <a:buNone/>
+            </a:pPr>
+            <a:r>
+              <a:rPr lang="en-US" dirty="0">
+                <a:latin typeface="Courier" pitchFamily="2" charset="0"/>
+              </a:rPr>
+              <a:t>recognized2= recognized;</a:t>
+            </a:r>
+          </a:p>
+          <a:p>
+            <a:pPr marL="0" indent="0">
+              <a:buNone/>
+            </a:pPr>
+            <a:r>
+              <a:rPr lang="en-US" dirty="0">
+                <a:solidFill>
+                  <a:schemeClr val="accent6">
+                    <a:lumMod val="75000"/>
+                  </a:schemeClr>
+                </a:solidFill>
+                <a:latin typeface="Courier" pitchFamily="2" charset="0"/>
+              </a:rPr>
+              <a:t>%If an item was recalled and is in presitemnos, set it to 0</a:t>
+            </a:r>
+          </a:p>
+          <a:p>
+            <a:pPr marL="0" indent="0">
+              <a:buNone/>
+            </a:pPr>
+            <a:r>
+              <a:rPr lang="en-US" dirty="0">
+                <a:latin typeface="Courier" pitchFamily="2" charset="0"/>
+              </a:rPr>
+              <a:t>recognized2(ismember(presitemnos, was_recalled))= nan;</a:t>
+            </a:r>
+          </a:p>
+          <a:p>
+            <a:pPr marL="0" indent="0">
+              <a:buNone/>
+            </a:pPr>
+            <a:r>
+              <a:rPr lang="en-US" dirty="0">
+                <a:solidFill>
+                  <a:srgbClr val="0432FF"/>
+                </a:solidFill>
+                <a:latin typeface="Courier" pitchFamily="2" charset="0"/>
+              </a:rPr>
+              <a:t>for</a:t>
+            </a:r>
+            <a:r>
+              <a:rPr lang="en-US" dirty="0">
+                <a:latin typeface="Courier" pitchFamily="2" charset="0"/>
+              </a:rPr>
+              <a:t> i = 1:LL</a:t>
+            </a:r>
+          </a:p>
+          <a:p>
+            <a:pPr marL="0" indent="0">
+              <a:buNone/>
+            </a:pPr>
+            <a:r>
+              <a:rPr lang="en-US" dirty="0">
+                <a:latin typeface="Courier" pitchFamily="2" charset="0"/>
+              </a:rPr>
+              <a:t>	fr_num_sp(i)= sum(sum(recognized2(:,i)==1));</a:t>
+            </a:r>
+          </a:p>
+          <a:p>
+            <a:pPr marL="0" indent="0">
+              <a:buNone/>
+            </a:pPr>
+            <a:r>
+              <a:rPr lang="en-US" dirty="0">
+                <a:solidFill>
+                  <a:schemeClr val="accent6">
+                    <a:lumMod val="75000"/>
+                  </a:schemeClr>
+                </a:solidFill>
+                <a:latin typeface="Courier" pitchFamily="2" charset="0"/>
+              </a:rPr>
+              <a:t>%Denominator taken out of all possible opportunities i.e.</a:t>
+            </a:r>
+          </a:p>
+          <a:p>
+            <a:pPr marL="0" indent="0">
+              <a:buNone/>
+            </a:pPr>
+            <a:r>
+              <a:rPr lang="en-US" dirty="0">
+                <a:solidFill>
+                  <a:schemeClr val="accent6">
+                    <a:lumMod val="75000"/>
+                  </a:schemeClr>
+                </a:solidFill>
+                <a:latin typeface="Courier" pitchFamily="2" charset="0"/>
+              </a:rPr>
+              <a:t>%Unlike recognized2, recognized only masks out items that were not tested</a:t>
+            </a:r>
+          </a:p>
+          <a:p>
+            <a:pPr marL="0" indent="0">
+              <a:buNone/>
+            </a:pPr>
+            <a:r>
+              <a:rPr lang="en-US" dirty="0">
+                <a:latin typeface="Courier" pitchFamily="2" charset="0"/>
+              </a:rPr>
+              <a:t>	fr_denom_sp(i)= sum(sum(~isnan(recognized(:,i))));</a:t>
+            </a:r>
+          </a:p>
+          <a:p>
+            <a:pPr marL="0" indent="0">
+              <a:buNone/>
+            </a:pPr>
+            <a:r>
+              <a:rPr lang="en-US" dirty="0">
+                <a:solidFill>
+                  <a:srgbClr val="0432FF"/>
+                </a:solidFill>
+                <a:latin typeface="Courier" pitchFamily="2" charset="0"/>
+              </a:rPr>
+              <a:t>end </a:t>
+            </a:r>
+          </a:p>
+          <a:p>
+            <a:pPr marL="0" indent="0">
+              <a:buNone/>
+            </a:pPr>
+            <a:endParaRPr lang="en-US" sz="2000" dirty="0">
+              <a:latin typeface="Courier" pitchFamily="2" charset="0"/>
+              <a:cs typeface="Times New Roman" panose="02020603050405020304" pitchFamily="18" charset="0"/>
+            </a:endParaRPr>
+          </a:p>
+        </p:txBody>
+      </p:sp>
+    </p:spTree>
+    <p:extLst>
+      <p:ext uri="{BB962C8B-B14F-4D97-AF65-F5344CB8AC3E}">
+        <p14:creationId xmlns:p14="http://schemas.microsoft.com/office/powerpoint/2010/main" val="2503375905"/>
+      </p:ext>
+    </p:extLst>
+  </p:cSld>
+  <p:clrMapOvr>
+    <a:masterClrMapping/>
+  </p:clrMapOvr>
+</p:sld>
+</file>
+
+<file path=ppt/slides/slide19.xml><?xml version="1.0" encoding="utf-8"?>
+<p:sld xmlns:a="http://schemas.openxmlformats.org/drawingml/2006/main" xmlns:r="http://schemas.openxmlformats.org/officeDocument/2006/relationships" xmlns:p="http://schemas.openxmlformats.org/presentationml/2006/main">
+  <p:cSld>
+    <p:bg>
+      <p:bgPr>
+        <a:solidFill>
+          <a:schemeClr val="bg1"/>
+        </a:solidFill>
+        <a:effectLst/>
+      </p:bgPr>
+    </p:bg>
+    <p:spTree>
+      <p:nvGrpSpPr>
+        <p:cNvPr id="1" name=""/>
+        <p:cNvGrpSpPr/>
+        <p:nvPr/>
+      </p:nvGrpSpPr>
+      <p:grpSpPr>
+        <a:xfrm>
+          <a:off x="0" y="0"/>
+          <a:ext cx="0" cy="0"/>
+          <a:chOff x="0" y="0"/>
+          <a:chExt cx="0" cy="0"/>
+        </a:xfrm>
+      </p:grpSpPr>
+      <p:sp>
+        <p:nvSpPr>
+          <p:cNvPr id="24" name="Rectangle 23">
+            <a:extLst>
+              <a:ext uri="{FF2B5EF4-FFF2-40B4-BE49-F238E27FC236}">
+                <a16:creationId xmlns:a16="http://schemas.microsoft.com/office/drawing/2014/main" id="{A5711A0E-A428-4ED1-96CB-33D69FD842E4}"/>
+              </a:ext>
+              <a:ext uri="{C183D7F6-B498-43B3-948B-1728B52AA6E4}">
+                <adec:decorative xmlns:adec="http://schemas.microsoft.com/office/drawing/2017/decorative" val="1"/>
+              </a:ext>
+            </a:extLst>
+          </p:cNvPr>
+          <p:cNvSpPr>
+            <a:spLocks noGrp="1" noRot="1" noChangeAspect="1" noMove="1" noResize="1" noEditPoints="1" noAdjustHandles="1" noChangeArrowheads="1" noChangeShapeType="1" noTextEdit="1"/>
+          </p:cNvSpPr>
+          <p:nvPr>
+            <p:extLst>
+              <p:ext uri="{386F3935-93C4-4BCD-93E2-E3B085C9AB24}">
+                <p16:designElem xmlns:p16="http://schemas.microsoft.com/office/powerpoint/2015/main" val="1"/>
+              </p:ext>
+            </p:extLst>
+          </p:nvPr>
+        </p:nvSpPr>
+        <p:spPr>
+          <a:xfrm>
+            <a:off x="1000874" y="2043803"/>
+            <a:ext cx="10190252" cy="80683"/>
+          </a:xfrm>
+          <a:prstGeom prst="rect">
+            <a:avLst/>
+          </a:prstGeom>
+          <a:solidFill>
+            <a:schemeClr val="tx1">
+              <a:lumMod val="50000"/>
+              <a:lumOff val="50000"/>
+              <a:alpha val="65000"/>
+            </a:schemeClr>
+          </a:solidFill>
+          <a:ln>
+            <a:noFill/>
+          </a:ln>
+        </p:spPr>
+        <p:style>
+          <a:lnRef idx="2">
+            <a:schemeClr val="accent1">
+              <a:shade val="50000"/>
+            </a:schemeClr>
+          </a:lnRef>
+          <a:fillRef idx="1">
+            <a:schemeClr val="accent1"/>
+          </a:fillRef>
+          <a:effectRef idx="0">
+            <a:schemeClr val="accent1"/>
+          </a:effectRef>
+          <a:fontRef idx="minor">
+            <a:schemeClr val="lt1"/>
+          </a:fontRef>
+        </p:style>
+        <p:txBody>
+          <a:bodyPr rtlCol="0" anchor="ctr"/>
+          <a:lstStyle/>
+          <a:p>
+            <a:pPr marL="0" marR="0" lvl="0" indent="0" algn="ctr" defTabSz="457200" rtl="0" eaLnBrk="1" fontAlgn="auto" latinLnBrk="0" hangingPunct="1">
+              <a:lnSpc>
+                <a:spcPct val="100000"/>
+              </a:lnSpc>
+              <a:spcBef>
+                <a:spcPts val="0"/>
+              </a:spcBef>
+              <a:spcAft>
+                <a:spcPts val="0"/>
+              </a:spcAft>
+              <a:buClrTx/>
+              <a:buSzTx/>
+              <a:buFontTx/>
+              <a:buNone/>
+              <a:tabLst/>
+              <a:defRPr/>
+            </a:pPr>
+            <a:endParaRPr kumimoji="0" lang="en-US" sz="1800" b="0" i="0" u="none" strike="noStrike" kern="1200" cap="none" spc="0" normalizeH="0" baseline="0" noProof="0">
+              <a:ln>
+                <a:noFill/>
+              </a:ln>
+              <a:solidFill>
+                <a:prstClr val="white"/>
+              </a:solidFill>
+              <a:effectLst/>
+              <a:uLnTx/>
+              <a:uFillTx/>
+              <a:latin typeface="Calibri" panose="020F0502020204030204"/>
+              <a:ea typeface="+mn-ea"/>
+              <a:cs typeface="+mn-cs"/>
+            </a:endParaRPr>
+          </a:p>
+        </p:txBody>
+      </p:sp>
+      <p:pic>
+        <p:nvPicPr>
+          <p:cNvPr id="18" name="Picture 17" descr="Chart, line chart&#10;&#10;Description automatically generated">
+            <a:extLst>
+              <a:ext uri="{FF2B5EF4-FFF2-40B4-BE49-F238E27FC236}">
+                <a16:creationId xmlns:a16="http://schemas.microsoft.com/office/drawing/2014/main" id="{A00B7913-F6FF-A74D-846C-A40E2B40A1EF}"/>
+              </a:ext>
+            </a:extLst>
+          </p:cNvPr>
+          <p:cNvPicPr>
+            <a:picLocks noChangeAspect="1"/>
+          </p:cNvPicPr>
+          <p:nvPr/>
+        </p:nvPicPr>
+        <p:blipFill>
+          <a:blip r:embed="rId3"/>
+          <a:stretch>
+            <a:fillRect/>
+          </a:stretch>
+        </p:blipFill>
+        <p:spPr>
+          <a:xfrm>
+            <a:off x="1208088" y="2384425"/>
+            <a:ext cx="4845050" cy="3616325"/>
+          </a:xfrm>
+          <a:prstGeom prst="rect">
+            <a:avLst/>
+          </a:prstGeom>
+        </p:spPr>
+      </p:pic>
+      <p:sp>
+        <p:nvSpPr>
+          <p:cNvPr id="8" name="TextBox 7">
+            <a:extLst>
+              <a:ext uri="{FF2B5EF4-FFF2-40B4-BE49-F238E27FC236}">
+                <a16:creationId xmlns:a16="http://schemas.microsoft.com/office/drawing/2014/main" id="{84C4839E-6CBE-4140-B863-6B1C27B0F0B0}"/>
+              </a:ext>
+            </a:extLst>
+          </p:cNvPr>
+          <p:cNvSpPr txBox="1"/>
+          <p:nvPr/>
+        </p:nvSpPr>
+        <p:spPr>
+          <a:xfrm>
+            <a:off x="1141413" y="5999163"/>
+            <a:ext cx="4845050" cy="722313"/>
+          </a:xfrm>
+          <a:prstGeom prst="rect">
+            <a:avLst/>
+          </a:prstGeom>
+          <a:solidFill>
+            <a:srgbClr val="000000">
+              <a:alpha val="50000"/>
+            </a:srgbClr>
+          </a:solidFill>
+          <a:ln>
+            <a:noFill/>
+          </a:ln>
+        </p:spPr>
+        <p:txBody>
+          <a:bodyPr wrap="square" rtlCol="0" anchor="ctr">
+            <a:noAutofit/>
+          </a:bodyPr>
+          <a:lstStyle/>
+          <a:p>
+            <a:pPr algn="ctr">
+              <a:spcAft>
+                <a:spcPts val="600"/>
+              </a:spcAft>
+            </a:pPr>
+            <a:r>
+              <a:rPr lang="en-US" sz="1300">
+                <a:solidFill>
+                  <a:srgbClr val="FFFFFF"/>
+                </a:solidFill>
+                <a:latin typeface="Times" pitchFamily="2" charset="0"/>
+              </a:rPr>
+              <a:t>Old Code With Correction</a:t>
+            </a:r>
+          </a:p>
+        </p:txBody>
+      </p:sp>
+      <p:pic>
+        <p:nvPicPr>
+          <p:cNvPr id="14" name="Content Placeholder 13" descr="Chart, line chart&#10;&#10;Description automatically generated">
+            <a:extLst>
+              <a:ext uri="{FF2B5EF4-FFF2-40B4-BE49-F238E27FC236}">
+                <a16:creationId xmlns:a16="http://schemas.microsoft.com/office/drawing/2014/main" id="{BBFD4C8B-A9B1-B746-9A38-5389BC67DB3B}"/>
+              </a:ext>
+            </a:extLst>
+          </p:cNvPr>
+          <p:cNvPicPr>
+            <a:picLocks noGrp="1" noChangeAspect="1"/>
+          </p:cNvPicPr>
+          <p:nvPr>
+            <p:ph idx="1"/>
+          </p:nvPr>
+        </p:nvPicPr>
+        <p:blipFill>
+          <a:blip r:embed="rId4"/>
+          <a:stretch>
+            <a:fillRect/>
+          </a:stretch>
+        </p:blipFill>
+        <p:spPr>
+          <a:xfrm>
+            <a:off x="6119813" y="2384425"/>
+            <a:ext cx="4862513" cy="3616325"/>
+          </a:xfrm>
+        </p:spPr>
+      </p:pic>
+      <p:sp>
+        <p:nvSpPr>
+          <p:cNvPr id="10" name="TextBox 9">
+            <a:extLst>
+              <a:ext uri="{FF2B5EF4-FFF2-40B4-BE49-F238E27FC236}">
+                <a16:creationId xmlns:a16="http://schemas.microsoft.com/office/drawing/2014/main" id="{3E6F89D9-6C40-3440-A8DF-6FEA29BA1FAC}"/>
+              </a:ext>
+            </a:extLst>
+          </p:cNvPr>
+          <p:cNvSpPr txBox="1"/>
+          <p:nvPr/>
+        </p:nvSpPr>
+        <p:spPr>
+          <a:xfrm>
+            <a:off x="6328613" y="5999162"/>
+            <a:ext cx="4862513" cy="722313"/>
+          </a:xfrm>
+          <a:prstGeom prst="rect">
+            <a:avLst/>
+          </a:prstGeom>
+          <a:solidFill>
+            <a:srgbClr val="000000">
+              <a:alpha val="50000"/>
+            </a:srgbClr>
+          </a:solidFill>
+          <a:ln>
+            <a:noFill/>
+          </a:ln>
+        </p:spPr>
+        <p:txBody>
+          <a:bodyPr wrap="square" rtlCol="0" anchor="ctr">
+            <a:noAutofit/>
+          </a:bodyPr>
+          <a:lstStyle/>
+          <a:p>
+            <a:pPr algn="ctr">
+              <a:spcAft>
+                <a:spcPts val="600"/>
+              </a:spcAft>
+            </a:pPr>
+            <a:r>
+              <a:rPr lang="en-US" sz="1300">
+                <a:solidFill>
+                  <a:srgbClr val="FFFFFF"/>
+                </a:solidFill>
+                <a:latin typeface="Times" pitchFamily="2" charset="0"/>
+              </a:rPr>
+              <a:t>New Code (Spot Checking)</a:t>
+            </a:r>
+          </a:p>
+        </p:txBody>
+      </p:sp>
+      <p:sp>
+        <p:nvSpPr>
+          <p:cNvPr id="2" name="Title 1">
+            <a:extLst>
+              <a:ext uri="{FF2B5EF4-FFF2-40B4-BE49-F238E27FC236}">
+                <a16:creationId xmlns:a16="http://schemas.microsoft.com/office/drawing/2014/main" id="{9604946D-B8B7-3D45-BE6B-06D7605C5D29}"/>
+              </a:ext>
+            </a:extLst>
+          </p:cNvPr>
+          <p:cNvSpPr>
+            <a:spLocks noGrp="1"/>
+          </p:cNvSpPr>
+          <p:nvPr>
+            <p:ph type="title"/>
+          </p:nvPr>
+        </p:nvSpPr>
+        <p:spPr>
+          <a:xfrm>
+            <a:off x="870204" y="606564"/>
+            <a:ext cx="10451592" cy="1325563"/>
+          </a:xfrm>
+        </p:spPr>
+        <p:txBody>
+          <a:bodyPr vert="horz" lIns="91440" tIns="45720" rIns="91440" bIns="45720" rtlCol="0" anchor="ctr">
+            <a:normAutofit/>
+          </a:bodyPr>
+          <a:lstStyle/>
+          <a:p>
+            <a:r>
+              <a:rPr lang="en-US" kern="1200">
+                <a:solidFill>
+                  <a:schemeClr val="tx1"/>
+                </a:solidFill>
+                <a:latin typeface="+mj-lt"/>
+                <a:ea typeface="+mj-ea"/>
+                <a:cs typeface="+mj-cs"/>
+              </a:rPr>
               <a:t>SPC Exclude IFR: Not Grouped by NaN Count</a:t>
             </a:r>
-            <a:endParaRPr lang="en-US" dirty="0"/>
-          </a:p>
-        </p:txBody>
-      </p:sp>
-      <p:sp>
-        <p:nvSpPr>
-          <p:cNvPr id="4" name="Content Placeholder 3">
-            <a:extLst>
-              <a:ext uri="{FF2B5EF4-FFF2-40B4-BE49-F238E27FC236}">
-                <a16:creationId xmlns:a16="http://schemas.microsoft.com/office/drawing/2014/main" id="{29C50355-ED15-344C-8FA7-68CD974254F9}"/>
-              </a:ext>
-            </a:extLst>
-          </p:cNvPr>
-          <p:cNvSpPr>
-            <a:spLocks noGrp="1"/>
-          </p:cNvSpPr>
-          <p:nvPr>
-            <p:ph idx="1"/>
-          </p:nvPr>
-        </p:nvSpPr>
-        <p:spPr/>
-        <p:txBody>
-          <a:bodyPr/>
-          <a:lstStyle/>
-          <a:p>
-            <a:endParaRPr lang="en-US"/>
           </a:p>
         </p:txBody>
       </p:sp>
@@ -4116,7 +5551,98 @@
 </p:sld>
 </file>
 
-<file path=ppt/slides/slide17.xml><?xml version="1.0" encoding="utf-8"?>
+<file path=ppt/slides/slide2.xml><?xml version="1.0" encoding="utf-8"?>
+<p:sld xmlns:a="http://schemas.openxmlformats.org/drawingml/2006/main" xmlns:r="http://schemas.openxmlformats.org/officeDocument/2006/relationships" xmlns:p="http://schemas.openxmlformats.org/presentationml/2006/main">
+  <p:cSld>
+    <p:spTree>
+      <p:nvGrpSpPr>
+        <p:cNvPr id="1" name=""/>
+        <p:cNvGrpSpPr/>
+        <p:nvPr/>
+      </p:nvGrpSpPr>
+      <p:grpSpPr>
+        <a:xfrm>
+          <a:off x="0" y="0"/>
+          <a:ext cx="0" cy="0"/>
+          <a:chOff x="0" y="0"/>
+          <a:chExt cx="0" cy="0"/>
+        </a:xfrm>
+      </p:grpSpPr>
+      <p:sp>
+        <p:nvSpPr>
+          <p:cNvPr id="2" name="Title 1">
+            <a:extLst>
+              <a:ext uri="{FF2B5EF4-FFF2-40B4-BE49-F238E27FC236}">
+                <a16:creationId xmlns:a16="http://schemas.microsoft.com/office/drawing/2014/main" id="{FD6F59E8-278C-6B40-9E4E-1FC357E796BC}"/>
+              </a:ext>
+            </a:extLst>
+          </p:cNvPr>
+          <p:cNvSpPr>
+            <a:spLocks noGrp="1"/>
+          </p:cNvSpPr>
+          <p:nvPr>
+            <p:ph type="title"/>
+          </p:nvPr>
+        </p:nvSpPr>
+        <p:spPr/>
+        <p:txBody>
+          <a:bodyPr/>
+          <a:lstStyle/>
+          <a:p>
+            <a:r>
+              <a:rPr lang="en-US" dirty="0">
+                <a:latin typeface="Times New Roman" panose="02020603050405020304" pitchFamily="18" charset="0"/>
+                <a:cs typeface="Times New Roman" panose="02020603050405020304" pitchFamily="18" charset="0"/>
+              </a:rPr>
+              <a:t>SPC Ignoring IFR: No NaNs </a:t>
+            </a:r>
+            <a:endParaRPr lang="en-US" dirty="0"/>
+          </a:p>
+        </p:txBody>
+      </p:sp>
+      <p:pic>
+        <p:nvPicPr>
+          <p:cNvPr id="5" name="Content Placeholder 4" descr="Chart, line chart&#10;&#10;Description automatically generated">
+            <a:extLst>
+              <a:ext uri="{FF2B5EF4-FFF2-40B4-BE49-F238E27FC236}">
+                <a16:creationId xmlns:a16="http://schemas.microsoft.com/office/drawing/2014/main" id="{F10C1105-8779-364C-986D-955733E8FBC7}"/>
+              </a:ext>
+            </a:extLst>
+          </p:cNvPr>
+          <p:cNvPicPr>
+            <a:picLocks noGrp="1" noChangeAspect="1"/>
+          </p:cNvPicPr>
+          <p:nvPr>
+            <p:ph idx="1"/>
+          </p:nvPr>
+        </p:nvPicPr>
+        <p:blipFill>
+          <a:blip r:embed="rId2"/>
+          <a:stretch>
+            <a:fillRect/>
+          </a:stretch>
+        </p:blipFill>
+        <p:spPr>
+          <a:xfrm>
+            <a:off x="3195108" y="1825625"/>
+            <a:ext cx="5801784" cy="4351338"/>
+          </a:xfrm>
+        </p:spPr>
+      </p:pic>
+    </p:spTree>
+    <p:extLst>
+      <p:ext uri="{BB962C8B-B14F-4D97-AF65-F5344CB8AC3E}">
+        <p14:creationId xmlns:p14="http://schemas.microsoft.com/office/powerpoint/2010/main" val="19623333"/>
+      </p:ext>
+    </p:extLst>
+  </p:cSld>
+  <p:clrMapOvr>
+    <a:masterClrMapping/>
+  </p:clrMapOvr>
+</p:sld>
+</file>
+
+<file path=ppt/slides/slide20.xml><?xml version="1.0" encoding="utf-8"?>
 <p:sld xmlns:a="http://schemas.openxmlformats.org/drawingml/2006/main" xmlns:r="http://schemas.openxmlformats.org/officeDocument/2006/relationships" xmlns:p="http://schemas.openxmlformats.org/presentationml/2006/main">
   <p:cSld>
     <p:bg>
@@ -4271,7 +5797,7 @@
           <a:lstStyle/>
           <a:p>
             <a:pPr algn="ctr"/>
-            <a:endParaRPr lang="en-US"/>
+            <a:endParaRPr lang="en-US" dirty="0"/>
           </a:p>
         </p:txBody>
       </p:sp>
@@ -4381,7 +5907,7 @@
           <a:lstStyle/>
           <a:p>
             <a:pPr algn="ctr"/>
-            <a:endParaRPr lang="en-US"/>
+            <a:endParaRPr lang="en-US" dirty="0"/>
           </a:p>
         </p:txBody>
       </p:sp>
@@ -4483,188 +6009,86 @@
           </a:p>
         </p:txBody>
       </p:sp>
+      <p:sp>
+        <p:nvSpPr>
+          <p:cNvPr id="14" name="TextBox 13">
+            <a:extLst>
+              <a:ext uri="{FF2B5EF4-FFF2-40B4-BE49-F238E27FC236}">
+                <a16:creationId xmlns:a16="http://schemas.microsoft.com/office/drawing/2014/main" id="{3A2CAF9D-1C8A-D042-AF6A-9A132E502060}"/>
+              </a:ext>
+            </a:extLst>
+          </p:cNvPr>
+          <p:cNvSpPr txBox="1"/>
+          <p:nvPr/>
+        </p:nvSpPr>
+        <p:spPr>
+          <a:xfrm>
+            <a:off x="1460500" y="4766790"/>
+            <a:ext cx="3962400" cy="369332"/>
+          </a:xfrm>
+          <a:prstGeom prst="rect">
+            <a:avLst/>
+          </a:prstGeom>
+          <a:noFill/>
+        </p:spPr>
+        <p:txBody>
+          <a:bodyPr wrap="square" rtlCol="0">
+            <a:spAutoFit/>
+          </a:bodyPr>
+          <a:lstStyle/>
+          <a:p>
+            <a:pPr algn="ctr"/>
+            <a:r>
+              <a:rPr lang="en-US" dirty="0">
+                <a:latin typeface="Times" pitchFamily="2" charset="0"/>
+              </a:rPr>
+              <a:t>Old Code Without Correction</a:t>
+            </a:r>
+          </a:p>
+        </p:txBody>
+      </p:sp>
+      <p:sp>
+        <p:nvSpPr>
+          <p:cNvPr id="15" name="TextBox 14">
+            <a:extLst>
+              <a:ext uri="{FF2B5EF4-FFF2-40B4-BE49-F238E27FC236}">
+                <a16:creationId xmlns:a16="http://schemas.microsoft.com/office/drawing/2014/main" id="{7019F51F-566E-E248-8590-2F3D7136D47D}"/>
+              </a:ext>
+            </a:extLst>
+          </p:cNvPr>
+          <p:cNvSpPr txBox="1"/>
+          <p:nvPr/>
+        </p:nvSpPr>
+        <p:spPr>
+          <a:xfrm>
+            <a:off x="6781837" y="4766790"/>
+            <a:ext cx="3962400" cy="369332"/>
+          </a:xfrm>
+          <a:prstGeom prst="rect">
+            <a:avLst/>
+          </a:prstGeom>
+          <a:noFill/>
+        </p:spPr>
+        <p:txBody>
+          <a:bodyPr wrap="square" rtlCol="0">
+            <a:spAutoFit/>
+          </a:bodyPr>
+          <a:lstStyle/>
+          <a:p>
+            <a:pPr algn="ctr"/>
+            <a:r>
+              <a:rPr lang="en-US" dirty="0">
+                <a:latin typeface="Times" pitchFamily="2" charset="0"/>
+              </a:rPr>
+              <a:t>Old Code With Correction</a:t>
+            </a:r>
+          </a:p>
+        </p:txBody>
+      </p:sp>
     </p:spTree>
     <p:extLst>
       <p:ext uri="{BB962C8B-B14F-4D97-AF65-F5344CB8AC3E}">
         <p14:creationId xmlns:p14="http://schemas.microsoft.com/office/powerpoint/2010/main" val="2311020901"/>
-      </p:ext>
-    </p:extLst>
-  </p:cSld>
-  <p:clrMapOvr>
-    <a:masterClrMapping/>
-  </p:clrMapOvr>
-</p:sld>
-</file>
-
-<file path=ppt/slides/slide18.xml><?xml version="1.0" encoding="utf-8"?>
-<p:sld xmlns:a="http://schemas.openxmlformats.org/drawingml/2006/main" xmlns:r="http://schemas.openxmlformats.org/officeDocument/2006/relationships" xmlns:p="http://schemas.openxmlformats.org/presentationml/2006/main">
-  <p:cSld>
-    <p:spTree>
-      <p:nvGrpSpPr>
-        <p:cNvPr id="1" name=""/>
-        <p:cNvGrpSpPr/>
-        <p:nvPr/>
-      </p:nvGrpSpPr>
-      <p:grpSpPr>
-        <a:xfrm>
-          <a:off x="0" y="0"/>
-          <a:ext cx="0" cy="0"/>
-          <a:chOff x="0" y="0"/>
-          <a:chExt cx="0" cy="0"/>
-        </a:xfrm>
-      </p:grpSpPr>
-      <p:sp>
-        <p:nvSpPr>
-          <p:cNvPr id="2" name="Title 1">
-            <a:extLst>
-              <a:ext uri="{FF2B5EF4-FFF2-40B4-BE49-F238E27FC236}">
-                <a16:creationId xmlns:a16="http://schemas.microsoft.com/office/drawing/2014/main" id="{9604946D-B8B7-3D45-BE6B-06D7605C5D29}"/>
-              </a:ext>
-            </a:extLst>
-          </p:cNvPr>
-          <p:cNvSpPr>
-            <a:spLocks noGrp="1"/>
-          </p:cNvSpPr>
-          <p:nvPr>
-            <p:ph type="title"/>
-          </p:nvPr>
-        </p:nvSpPr>
-        <p:spPr/>
-        <p:txBody>
-          <a:bodyPr/>
-          <a:lstStyle/>
-          <a:p>
-            <a:r>
-              <a:rPr lang="en-US" dirty="0">
-                <a:latin typeface="Times New Roman" panose="02020603050405020304" pitchFamily="18" charset="0"/>
-                <a:cs typeface="Times New Roman" panose="02020603050405020304" pitchFamily="18" charset="0"/>
-              </a:rPr>
-              <a:t>SPC Conditional on IFR : High NaNs </a:t>
-            </a:r>
-            <a:endParaRPr lang="en-US" dirty="0"/>
-          </a:p>
-        </p:txBody>
-      </p:sp>
-      <p:sp>
-        <p:nvSpPr>
-          <p:cNvPr id="4" name="Content Placeholder 3">
-            <a:extLst>
-              <a:ext uri="{FF2B5EF4-FFF2-40B4-BE49-F238E27FC236}">
-                <a16:creationId xmlns:a16="http://schemas.microsoft.com/office/drawing/2014/main" id="{29C50355-ED15-344C-8FA7-68CD974254F9}"/>
-              </a:ext>
-            </a:extLst>
-          </p:cNvPr>
-          <p:cNvSpPr>
-            <a:spLocks noGrp="1"/>
-          </p:cNvSpPr>
-          <p:nvPr>
-            <p:ph idx="1"/>
-          </p:nvPr>
-        </p:nvSpPr>
-        <p:spPr/>
-        <p:txBody>
-          <a:bodyPr/>
-          <a:lstStyle/>
-          <a:p>
-            <a:endParaRPr lang="en-US"/>
-          </a:p>
-        </p:txBody>
-      </p:sp>
-    </p:spTree>
-    <p:extLst>
-      <p:ext uri="{BB962C8B-B14F-4D97-AF65-F5344CB8AC3E}">
-        <p14:creationId xmlns:p14="http://schemas.microsoft.com/office/powerpoint/2010/main" val="2185408066"/>
-      </p:ext>
-    </p:extLst>
-  </p:cSld>
-  <p:clrMapOvr>
-    <a:masterClrMapping/>
-  </p:clrMapOvr>
-</p:sld>
-</file>
-
-<file path=ppt/slides/slide2.xml><?xml version="1.0" encoding="utf-8"?>
-<p:sld xmlns:a="http://schemas.openxmlformats.org/drawingml/2006/main" xmlns:r="http://schemas.openxmlformats.org/officeDocument/2006/relationships" xmlns:p="http://schemas.openxmlformats.org/presentationml/2006/main">
-  <p:cSld>
-    <p:spTree>
-      <p:nvGrpSpPr>
-        <p:cNvPr id="1" name=""/>
-        <p:cNvGrpSpPr/>
-        <p:nvPr/>
-      </p:nvGrpSpPr>
-      <p:grpSpPr>
-        <a:xfrm>
-          <a:off x="0" y="0"/>
-          <a:ext cx="0" cy="0"/>
-          <a:chOff x="0" y="0"/>
-          <a:chExt cx="0" cy="0"/>
-        </a:xfrm>
-      </p:grpSpPr>
-      <p:sp>
-        <p:nvSpPr>
-          <p:cNvPr id="2" name="Title 1">
-            <a:extLst>
-              <a:ext uri="{FF2B5EF4-FFF2-40B4-BE49-F238E27FC236}">
-                <a16:creationId xmlns:a16="http://schemas.microsoft.com/office/drawing/2014/main" id="{FD6F59E8-278C-6B40-9E4E-1FC357E796BC}"/>
-              </a:ext>
-            </a:extLst>
-          </p:cNvPr>
-          <p:cNvSpPr>
-            <a:spLocks noGrp="1"/>
-          </p:cNvSpPr>
-          <p:nvPr>
-            <p:ph type="title"/>
-          </p:nvPr>
-        </p:nvSpPr>
-        <p:spPr/>
-        <p:txBody>
-          <a:bodyPr/>
-          <a:lstStyle/>
-          <a:p>
-            <a:r>
-              <a:rPr lang="en-US" dirty="0">
-                <a:latin typeface="Times New Roman" panose="02020603050405020304" pitchFamily="18" charset="0"/>
-                <a:cs typeface="Times New Roman" panose="02020603050405020304" pitchFamily="18" charset="0"/>
-              </a:rPr>
-              <a:t>SPC Ignoring IFR: No NaNs </a:t>
-            </a:r>
-            <a:endParaRPr lang="en-US" dirty="0"/>
-          </a:p>
-        </p:txBody>
-      </p:sp>
-      <p:pic>
-        <p:nvPicPr>
-          <p:cNvPr id="5" name="Content Placeholder 4" descr="Chart, line chart&#10;&#10;Description automatically generated">
-            <a:extLst>
-              <a:ext uri="{FF2B5EF4-FFF2-40B4-BE49-F238E27FC236}">
-                <a16:creationId xmlns:a16="http://schemas.microsoft.com/office/drawing/2014/main" id="{F10C1105-8779-364C-986D-955733E8FBC7}"/>
-              </a:ext>
-            </a:extLst>
-          </p:cNvPr>
-          <p:cNvPicPr>
-            <a:picLocks noGrp="1" noChangeAspect="1"/>
-          </p:cNvPicPr>
-          <p:nvPr>
-            <p:ph idx="1"/>
-          </p:nvPr>
-        </p:nvPicPr>
-        <p:blipFill>
-          <a:blip r:embed="rId2"/>
-          <a:stretch>
-            <a:fillRect/>
-          </a:stretch>
-        </p:blipFill>
-        <p:spPr>
-          <a:xfrm>
-            <a:off x="3195108" y="1825625"/>
-            <a:ext cx="5801784" cy="4351338"/>
-          </a:xfrm>
-        </p:spPr>
-      </p:pic>
-    </p:spTree>
-    <p:extLst>
-      <p:ext uri="{BB962C8B-B14F-4D97-AF65-F5344CB8AC3E}">
-        <p14:creationId xmlns:p14="http://schemas.microsoft.com/office/powerpoint/2010/main" val="19623333"/>
       </p:ext>
     </p:extLst>
   </p:cSld>
@@ -5644,4 +7068,299 @@
     </a:ext>
   </a:extLst>
 </a:theme>
+</file>
+
+<file path=ppt/theme/theme2.xml><?xml version="1.0" encoding="utf-8"?>
+<a:theme xmlns:a="http://schemas.openxmlformats.org/drawingml/2006/main" name="Office Theme">
+  <a:themeElements>
+    <a:clrScheme name="Office">
+      <a:dk1>
+        <a:sysClr val="windowText" lastClr="000000"/>
+      </a:dk1>
+      <a:lt1>
+        <a:sysClr val="window" lastClr="FFFFFF"/>
+      </a:lt1>
+      <a:dk2>
+        <a:srgbClr val="44546A"/>
+      </a:dk2>
+      <a:lt2>
+        <a:srgbClr val="E7E6E6"/>
+      </a:lt2>
+      <a:accent1>
+        <a:srgbClr val="4472C4"/>
+      </a:accent1>
+      <a:accent2>
+        <a:srgbClr val="ED7D31"/>
+      </a:accent2>
+      <a:accent3>
+        <a:srgbClr val="A5A5A5"/>
+      </a:accent3>
+      <a:accent4>
+        <a:srgbClr val="FFC000"/>
+      </a:accent4>
+      <a:accent5>
+        <a:srgbClr val="5B9BD5"/>
+      </a:accent5>
+      <a:accent6>
+        <a:srgbClr val="70AD47"/>
+      </a:accent6>
+      <a:hlink>
+        <a:srgbClr val="0563C1"/>
+      </a:hlink>
+      <a:folHlink>
+        <a:srgbClr val="954F72"/>
+      </a:folHlink>
+    </a:clrScheme>
+    <a:fontScheme name="Office">
+      <a:majorFont>
+        <a:latin typeface="Calibri Light" panose="020F0302020204030204"/>
+        <a:ea typeface=""/>
+        <a:cs typeface=""/>
+        <a:font script="Jpan" typeface="游ゴシック Light"/>
+        <a:font script="Hang" typeface="맑은 고딕"/>
+        <a:font script="Hans" typeface="等线 Light"/>
+        <a:font script="Hant" typeface="新細明體"/>
+        <a:font script="Arab" typeface="Times New Roman"/>
+        <a:font script="Hebr" typeface="Times New Roman"/>
+        <a:font script="Thai" typeface="Angsana New"/>
+        <a:font script="Ethi" typeface="Nyala"/>
+        <a:font script="Beng" typeface="Vrinda"/>
+        <a:font script="Gujr" typeface="Shruti"/>
+        <a:font script="Khmr" typeface="MoolBoran"/>
+        <a:font script="Knda" typeface="Tunga"/>
+        <a:font script="Guru" typeface="Raavi"/>
+        <a:font script="Cans" typeface="Euphemia"/>
+        <a:font script="Cher" typeface="Plantagenet Cherokee"/>
+        <a:font script="Yiii" typeface="Microsoft Yi Baiti"/>
+        <a:font script="Tibt" typeface="Microsoft Himalaya"/>
+        <a:font script="Thaa" typeface="MV Boli"/>
+        <a:font script="Deva" typeface="Mangal"/>
+        <a:font script="Telu" typeface="Gautami"/>
+        <a:font script="Taml" typeface="Latha"/>
+        <a:font script="Syrc" typeface="Estrangelo Edessa"/>
+        <a:font script="Orya" typeface="Kalinga"/>
+        <a:font script="Mlym" typeface="Kartika"/>
+        <a:font script="Laoo" typeface="DokChampa"/>
+        <a:font script="Sinh" typeface="Iskoola Pota"/>
+        <a:font script="Mong" typeface="Mongolian Baiti"/>
+        <a:font script="Viet" typeface="Times New Roman"/>
+        <a:font script="Uigh" typeface="Microsoft Uighur"/>
+        <a:font script="Geor" typeface="Sylfaen"/>
+        <a:font script="Armn" typeface="Arial"/>
+        <a:font script="Bugi" typeface="Leelawadee UI"/>
+        <a:font script="Bopo" typeface="Microsoft JhengHei"/>
+        <a:font script="Java" typeface="Javanese Text"/>
+        <a:font script="Lisu" typeface="Segoe UI"/>
+        <a:font script="Mymr" typeface="Myanmar Text"/>
+        <a:font script="Nkoo" typeface="Ebrima"/>
+        <a:font script="Olck" typeface="Nirmala UI"/>
+        <a:font script="Osma" typeface="Ebrima"/>
+        <a:font script="Phag" typeface="Phagspa"/>
+        <a:font script="Syrn" typeface="Estrangelo Edessa"/>
+        <a:font script="Syrj" typeface="Estrangelo Edessa"/>
+        <a:font script="Syre" typeface="Estrangelo Edessa"/>
+        <a:font script="Sora" typeface="Nirmala UI"/>
+        <a:font script="Tale" typeface="Microsoft Tai Le"/>
+        <a:font script="Talu" typeface="Microsoft New Tai Lue"/>
+        <a:font script="Tfng" typeface="Ebrima"/>
+      </a:majorFont>
+      <a:minorFont>
+        <a:latin typeface="Calibri" panose="020F0502020204030204"/>
+        <a:ea typeface=""/>
+        <a:cs typeface=""/>
+        <a:font script="Jpan" typeface="游ゴシック"/>
+        <a:font script="Hang" typeface="맑은 고딕"/>
+        <a:font script="Hans" typeface="等线"/>
+        <a:font script="Hant" typeface="新細明體"/>
+        <a:font script="Arab" typeface="Arial"/>
+        <a:font script="Hebr" typeface="Arial"/>
+        <a:font script="Thai" typeface="Cordia New"/>
+        <a:font script="Ethi" typeface="Nyala"/>
+        <a:font script="Beng" typeface="Vrinda"/>
+        <a:font script="Gujr" typeface="Shruti"/>
+        <a:font script="Khmr" typeface="DaunPenh"/>
+        <a:font script="Knda" typeface="Tunga"/>
+        <a:font script="Guru" typeface="Raavi"/>
+        <a:font script="Cans" typeface="Euphemia"/>
+        <a:font script="Cher" typeface="Plantagenet Cherokee"/>
+        <a:font script="Yiii" typeface="Microsoft Yi Baiti"/>
+        <a:font script="Tibt" typeface="Microsoft Himalaya"/>
+        <a:font script="Thaa" typeface="MV Boli"/>
+        <a:font script="Deva" typeface="Mangal"/>
+        <a:font script="Telu" typeface="Gautami"/>
+        <a:font script="Taml" typeface="Latha"/>
+        <a:font script="Syrc" typeface="Estrangelo Edessa"/>
+        <a:font script="Orya" typeface="Kalinga"/>
+        <a:font script="Mlym" typeface="Kartika"/>
+        <a:font script="Laoo" typeface="DokChampa"/>
+        <a:font script="Sinh" typeface="Iskoola Pota"/>
+        <a:font script="Mong" typeface="Mongolian Baiti"/>
+        <a:font script="Viet" typeface="Arial"/>
+        <a:font script="Uigh" typeface="Microsoft Uighur"/>
+        <a:font script="Geor" typeface="Sylfaen"/>
+        <a:font script="Armn" typeface="Arial"/>
+        <a:font script="Bugi" typeface="Leelawadee UI"/>
+        <a:font script="Bopo" typeface="Microsoft JhengHei"/>
+        <a:font script="Java" typeface="Javanese Text"/>
+        <a:font script="Lisu" typeface="Segoe UI"/>
+        <a:font script="Mymr" typeface="Myanmar Text"/>
+        <a:font script="Nkoo" typeface="Ebrima"/>
+        <a:font script="Olck" typeface="Nirmala UI"/>
+        <a:font script="Osma" typeface="Ebrima"/>
+        <a:font script="Phag" typeface="Phagspa"/>
+        <a:font script="Syrn" typeface="Estrangelo Edessa"/>
+        <a:font script="Syrj" typeface="Estrangelo Edessa"/>
+        <a:font script="Syre" typeface="Estrangelo Edessa"/>
+        <a:font script="Sora" typeface="Nirmala UI"/>
+        <a:font script="Tale" typeface="Microsoft Tai Le"/>
+        <a:font script="Talu" typeface="Microsoft New Tai Lue"/>
+        <a:font script="Tfng" typeface="Ebrima"/>
+      </a:minorFont>
+    </a:fontScheme>
+    <a:fmtScheme name="Office">
+      <a:fillStyleLst>
+        <a:solidFill>
+          <a:schemeClr val="phClr"/>
+        </a:solidFill>
+        <a:gradFill rotWithShape="1">
+          <a:gsLst>
+            <a:gs pos="0">
+              <a:schemeClr val="phClr">
+                <a:lumMod val="110000"/>
+                <a:satMod val="105000"/>
+                <a:tint val="67000"/>
+              </a:schemeClr>
+            </a:gs>
+            <a:gs pos="50000">
+              <a:schemeClr val="phClr">
+                <a:lumMod val="105000"/>
+                <a:satMod val="103000"/>
+                <a:tint val="73000"/>
+              </a:schemeClr>
+            </a:gs>
+            <a:gs pos="100000">
+              <a:schemeClr val="phClr">
+                <a:lumMod val="105000"/>
+                <a:satMod val="109000"/>
+                <a:tint val="81000"/>
+              </a:schemeClr>
+            </a:gs>
+          </a:gsLst>
+          <a:lin ang="5400000" scaled="0"/>
+        </a:gradFill>
+        <a:gradFill rotWithShape="1">
+          <a:gsLst>
+            <a:gs pos="0">
+              <a:schemeClr val="phClr">
+                <a:satMod val="103000"/>
+                <a:lumMod val="102000"/>
+                <a:tint val="94000"/>
+              </a:schemeClr>
+            </a:gs>
+            <a:gs pos="50000">
+              <a:schemeClr val="phClr">
+                <a:satMod val="110000"/>
+                <a:lumMod val="100000"/>
+                <a:shade val="100000"/>
+              </a:schemeClr>
+            </a:gs>
+            <a:gs pos="100000">
+              <a:schemeClr val="phClr">
+                <a:lumMod val="99000"/>
+                <a:satMod val="120000"/>
+                <a:shade val="78000"/>
+              </a:schemeClr>
+            </a:gs>
+          </a:gsLst>
+          <a:lin ang="5400000" scaled="0"/>
+        </a:gradFill>
+      </a:fillStyleLst>
+      <a:lnStyleLst>
+        <a:ln w="6350" cap="flat" cmpd="sng" algn="ctr">
+          <a:solidFill>
+            <a:schemeClr val="phClr"/>
+          </a:solidFill>
+          <a:prstDash val="solid"/>
+          <a:miter lim="800000"/>
+        </a:ln>
+        <a:ln w="12700" cap="flat" cmpd="sng" algn="ctr">
+          <a:solidFill>
+            <a:schemeClr val="phClr"/>
+          </a:solidFill>
+          <a:prstDash val="solid"/>
+          <a:miter lim="800000"/>
+        </a:ln>
+        <a:ln w="19050" cap="flat" cmpd="sng" algn="ctr">
+          <a:solidFill>
+            <a:schemeClr val="phClr"/>
+          </a:solidFill>
+          <a:prstDash val="solid"/>
+          <a:miter lim="800000"/>
+        </a:ln>
+      </a:lnStyleLst>
+      <a:effectStyleLst>
+        <a:effectStyle>
+          <a:effectLst/>
+        </a:effectStyle>
+        <a:effectStyle>
+          <a:effectLst/>
+        </a:effectStyle>
+        <a:effectStyle>
+          <a:effectLst>
+            <a:outerShdw blurRad="57150" dist="19050" dir="5400000" algn="ctr" rotWithShape="0">
+              <a:srgbClr val="000000">
+                <a:alpha val="63000"/>
+              </a:srgbClr>
+            </a:outerShdw>
+          </a:effectLst>
+        </a:effectStyle>
+      </a:effectStyleLst>
+      <a:bgFillStyleLst>
+        <a:solidFill>
+          <a:schemeClr val="phClr"/>
+        </a:solidFill>
+        <a:solidFill>
+          <a:schemeClr val="phClr">
+            <a:tint val="95000"/>
+            <a:satMod val="170000"/>
+          </a:schemeClr>
+        </a:solidFill>
+        <a:gradFill rotWithShape="1">
+          <a:gsLst>
+            <a:gs pos="0">
+              <a:schemeClr val="phClr">
+                <a:tint val="93000"/>
+                <a:satMod val="150000"/>
+                <a:shade val="98000"/>
+                <a:lumMod val="102000"/>
+              </a:schemeClr>
+            </a:gs>
+            <a:gs pos="50000">
+              <a:schemeClr val="phClr">
+                <a:tint val="98000"/>
+                <a:satMod val="130000"/>
+                <a:shade val="90000"/>
+                <a:lumMod val="103000"/>
+              </a:schemeClr>
+            </a:gs>
+            <a:gs pos="100000">
+              <a:schemeClr val="phClr">
+                <a:shade val="63000"/>
+                <a:satMod val="120000"/>
+              </a:schemeClr>
+            </a:gs>
+          </a:gsLst>
+          <a:lin ang="5400000" scaled="0"/>
+        </a:gradFill>
+      </a:bgFillStyleLst>
+    </a:fmtScheme>
+  </a:themeElements>
+  <a:objectDefaults/>
+  <a:extraClrSchemeLst/>
+  <a:extLst>
+    <a:ext uri="{05A4C25C-085E-4340-85A3-A5531E510DB2}">
+      <thm15:themeFamily xmlns:thm15="http://schemas.microsoft.com/office/thememl/2012/main" name="Office Theme" id="{62F939B6-93AF-4DB8-9C6B-D6C7DFDC589F}" vid="{4A3C46E8-61CC-4603-A589-7422A47A8E4A}"/>
+    </a:ext>
+  </a:extLst>
+</a:theme>
 </file>
</xml_diff>